<commit_message>
notes on presentation draft
</commit_message>
<xml_diff>
--- a/DengAI.pptx
+++ b/DengAI.pptx
@@ -2701,7 +2701,7 @@
           <a:p>
             <a:fld id="{334ABD86-957F-40B1-87EE-A6C3B2CAB03E}" type="datetimeFigureOut">
               <a:rPr lang="en-US" smtClean="0"/>
-              <a:t>4/8/2019</a:t>
+              <a:t>4/9/2019</a:t>
             </a:fld>
             <a:endParaRPr lang="en-US"/>
           </a:p>
@@ -2878,7 +2878,7 @@
           <a:p>
             <a:fld id="{053F9076-56CE-4656-BEB1-49012D9996C0}" type="datetimeFigureOut">
               <a:rPr lang="en-US" smtClean="0"/>
-              <a:t>4/8/2019</a:t>
+              <a:t>4/9/2019</a:t>
             </a:fld>
             <a:endParaRPr lang="en-US"/>
           </a:p>
@@ -3191,13 +3191,94 @@
           <a:p>
             <a:r>
               <a:rPr lang="en-US" dirty="0"/>
-              <a:t>Better Contrast – especially with the red</a:t>
+              <a:t>Tone down the peach and/or add grid behind chart</a:t>
             </a:r>
           </a:p>
+        </p:txBody>
+      </p:sp>
+      <p:sp>
+        <p:nvSpPr>
+          <p:cNvPr id="4" name="Slide Number Placeholder 3"/>
+          <p:cNvSpPr>
+            <a:spLocks noGrp="1"/>
+          </p:cNvSpPr>
+          <p:nvPr>
+            <p:ph type="sldNum" sz="quarter" idx="5"/>
+          </p:nvPr>
+        </p:nvSpPr>
+        <p:spPr/>
+        <p:txBody>
+          <a:bodyPr/>
+          <a:lstStyle/>
+          <a:p>
+            <a:fld id="{A1DD606A-F46B-421B-8C76-016A1005836C}" type="slidenum">
+              <a:rPr lang="en-US" smtClean="0"/>
+              <a:t>3</a:t>
+            </a:fld>
+            <a:endParaRPr lang="en-US"/>
+          </a:p>
+        </p:txBody>
+      </p:sp>
+    </p:spTree>
+    <p:extLst>
+      <p:ext uri="{BB962C8B-B14F-4D97-AF65-F5344CB8AC3E}">
+        <p14:creationId xmlns:p14="http://schemas.microsoft.com/office/powerpoint/2010/main" val="38540232"/>
+      </p:ext>
+    </p:extLst>
+  </p:cSld>
+  <p:clrMapOvr>
+    <a:masterClrMapping/>
+  </p:clrMapOvr>
+</p:notes>
+</file>
+
+<file path=ppt/notesSlides/notesSlide2.xml><?xml version="1.0" encoding="utf-8"?>
+<p:notes xmlns:a="http://schemas.openxmlformats.org/drawingml/2006/main" xmlns:r="http://schemas.openxmlformats.org/officeDocument/2006/relationships" xmlns:p="http://schemas.openxmlformats.org/presentationml/2006/main">
+  <p:cSld>
+    <p:spTree>
+      <p:nvGrpSpPr>
+        <p:cNvPr id="1" name=""/>
+        <p:cNvGrpSpPr/>
+        <p:nvPr/>
+      </p:nvGrpSpPr>
+      <p:grpSpPr>
+        <a:xfrm>
+          <a:off x="0" y="0"/>
+          <a:ext cx="0" cy="0"/>
+          <a:chOff x="0" y="0"/>
+          <a:chExt cx="0" cy="0"/>
+        </a:xfrm>
+      </p:grpSpPr>
+      <p:sp>
+        <p:nvSpPr>
+          <p:cNvPr id="2" name="Slide Image Placeholder 1"/>
+          <p:cNvSpPr>
+            <a:spLocks noGrp="1" noRot="1" noChangeAspect="1"/>
+          </p:cNvSpPr>
+          <p:nvPr>
+            <p:ph type="sldImg"/>
+          </p:nvPr>
+        </p:nvSpPr>
+        <p:spPr/>
+      </p:sp>
+      <p:sp>
+        <p:nvSpPr>
+          <p:cNvPr id="3" name="Notes Placeholder 2"/>
+          <p:cNvSpPr>
+            <a:spLocks noGrp="1"/>
+          </p:cNvSpPr>
+          <p:nvPr>
+            <p:ph type="body" idx="1"/>
+          </p:nvPr>
+        </p:nvSpPr>
+        <p:spPr/>
+        <p:txBody>
+          <a:bodyPr/>
+          <a:lstStyle/>
           <a:p>
             <a:r>
               <a:rPr lang="en-US" dirty="0"/>
-              <a:t>Bigger</a:t>
+              <a:t>Consider flashing the whole chart first</a:t>
             </a:r>
           </a:p>
         </p:txBody>
@@ -3238,7 +3319,94 @@
 </p:notes>
 </file>
 
-<file path=ppt/notesSlides/notesSlide2.xml><?xml version="1.0" encoding="utf-8"?>
+<file path=ppt/notesSlides/notesSlide3.xml><?xml version="1.0" encoding="utf-8"?>
+<p:notes xmlns:a="http://schemas.openxmlformats.org/drawingml/2006/main" xmlns:r="http://schemas.openxmlformats.org/officeDocument/2006/relationships" xmlns:p="http://schemas.openxmlformats.org/presentationml/2006/main">
+  <p:cSld>
+    <p:spTree>
+      <p:nvGrpSpPr>
+        <p:cNvPr id="1" name=""/>
+        <p:cNvGrpSpPr/>
+        <p:nvPr/>
+      </p:nvGrpSpPr>
+      <p:grpSpPr>
+        <a:xfrm>
+          <a:off x="0" y="0"/>
+          <a:ext cx="0" cy="0"/>
+          <a:chOff x="0" y="0"/>
+          <a:chExt cx="0" cy="0"/>
+        </a:xfrm>
+      </p:grpSpPr>
+      <p:sp>
+        <p:nvSpPr>
+          <p:cNvPr id="2" name="Slide Image Placeholder 1"/>
+          <p:cNvSpPr>
+            <a:spLocks noGrp="1" noRot="1" noChangeAspect="1"/>
+          </p:cNvSpPr>
+          <p:nvPr>
+            <p:ph type="sldImg"/>
+          </p:nvPr>
+        </p:nvSpPr>
+        <p:spPr/>
+      </p:sp>
+      <p:sp>
+        <p:nvSpPr>
+          <p:cNvPr id="3" name="Notes Placeholder 2"/>
+          <p:cNvSpPr>
+            <a:spLocks noGrp="1"/>
+          </p:cNvSpPr>
+          <p:nvPr>
+            <p:ph type="body" idx="1"/>
+          </p:nvPr>
+        </p:nvSpPr>
+        <p:spPr/>
+        <p:txBody>
+          <a:bodyPr/>
+          <a:lstStyle/>
+          <a:p>
+            <a:r>
+              <a:rPr lang="en-US" dirty="0"/>
+              <a:t>Add score</a:t>
+            </a:r>
+          </a:p>
+        </p:txBody>
+      </p:sp>
+      <p:sp>
+        <p:nvSpPr>
+          <p:cNvPr id="4" name="Slide Number Placeholder 3"/>
+          <p:cNvSpPr>
+            <a:spLocks noGrp="1"/>
+          </p:cNvSpPr>
+          <p:nvPr>
+            <p:ph type="sldNum" sz="quarter" idx="5"/>
+          </p:nvPr>
+        </p:nvSpPr>
+        <p:spPr/>
+        <p:txBody>
+          <a:bodyPr/>
+          <a:lstStyle/>
+          <a:p>
+            <a:fld id="{A1DD606A-F46B-421B-8C76-016A1005836C}" type="slidenum">
+              <a:rPr lang="en-US" smtClean="0"/>
+              <a:t>16</a:t>
+            </a:fld>
+            <a:endParaRPr lang="en-US"/>
+          </a:p>
+        </p:txBody>
+      </p:sp>
+    </p:spTree>
+    <p:extLst>
+      <p:ext uri="{BB962C8B-B14F-4D97-AF65-F5344CB8AC3E}">
+        <p14:creationId xmlns:p14="http://schemas.microsoft.com/office/powerpoint/2010/main" val="2487942149"/>
+      </p:ext>
+    </p:extLst>
+  </p:cSld>
+  <p:clrMapOvr>
+    <a:masterClrMapping/>
+  </p:clrMapOvr>
+</p:notes>
+</file>
+
+<file path=ppt/notesSlides/notesSlide4.xml><?xml version="1.0" encoding="utf-8"?>
 <p:notes xmlns:a="http://schemas.openxmlformats.org/drawingml/2006/main" xmlns:r="http://schemas.openxmlformats.org/officeDocument/2006/relationships" xmlns:p="http://schemas.openxmlformats.org/presentationml/2006/main">
   <p:cSld>
     <p:spTree>
@@ -3469,7 +3637,7 @@
           <a:p>
             <a:fld id="{439CE6F7-9533-4255-A38D-1E6294581F5A}" type="datetimeFigureOut">
               <a:rPr lang="en-US" smtClean="0"/>
-              <a:t>4/8/2019</a:t>
+              <a:t>4/9/2019</a:t>
             </a:fld>
             <a:endParaRPr lang="en-US"/>
           </a:p>
@@ -3667,7 +3835,7 @@
           <a:p>
             <a:fld id="{439CE6F7-9533-4255-A38D-1E6294581F5A}" type="datetimeFigureOut">
               <a:rPr lang="en-US" smtClean="0"/>
-              <a:t>4/8/2019</a:t>
+              <a:t>4/9/2019</a:t>
             </a:fld>
             <a:endParaRPr lang="en-US"/>
           </a:p>
@@ -3875,7 +4043,7 @@
           <a:p>
             <a:fld id="{439CE6F7-9533-4255-A38D-1E6294581F5A}" type="datetimeFigureOut">
               <a:rPr lang="en-US" smtClean="0"/>
-              <a:t>4/8/2019</a:t>
+              <a:t>4/9/2019</a:t>
             </a:fld>
             <a:endParaRPr lang="en-US"/>
           </a:p>
@@ -4275,7 +4443,7 @@
           <a:p>
             <a:fld id="{439CE6F7-9533-4255-A38D-1E6294581F5A}" type="datetimeFigureOut">
               <a:rPr lang="en-US" smtClean="0"/>
-              <a:t>4/8/2019</a:t>
+              <a:t>4/9/2019</a:t>
             </a:fld>
             <a:endParaRPr lang="en-US"/>
           </a:p>
@@ -4540,7 +4708,7 @@
           <a:p>
             <a:fld id="{439CE6F7-9533-4255-A38D-1E6294581F5A}" type="datetimeFigureOut">
               <a:rPr lang="en-US" smtClean="0"/>
-              <a:t>4/8/2019</a:t>
+              <a:t>4/9/2019</a:t>
             </a:fld>
             <a:endParaRPr lang="en-US"/>
           </a:p>
@@ -4952,7 +5120,7 @@
           <a:p>
             <a:fld id="{439CE6F7-9533-4255-A38D-1E6294581F5A}" type="datetimeFigureOut">
               <a:rPr lang="en-US" smtClean="0"/>
-              <a:t>4/8/2019</a:t>
+              <a:t>4/9/2019</a:t>
             </a:fld>
             <a:endParaRPr lang="en-US"/>
           </a:p>
@@ -5093,7 +5261,7 @@
           <a:p>
             <a:fld id="{439CE6F7-9533-4255-A38D-1E6294581F5A}" type="datetimeFigureOut">
               <a:rPr lang="en-US" smtClean="0"/>
-              <a:t>4/8/2019</a:t>
+              <a:t>4/9/2019</a:t>
             </a:fld>
             <a:endParaRPr lang="en-US"/>
           </a:p>
@@ -5206,7 +5374,7 @@
           <a:p>
             <a:fld id="{439CE6F7-9533-4255-A38D-1E6294581F5A}" type="datetimeFigureOut">
               <a:rPr lang="en-US" smtClean="0"/>
-              <a:t>4/8/2019</a:t>
+              <a:t>4/9/2019</a:t>
             </a:fld>
             <a:endParaRPr lang="en-US"/>
           </a:p>
@@ -5517,7 +5685,7 @@
           <a:p>
             <a:fld id="{439CE6F7-9533-4255-A38D-1E6294581F5A}" type="datetimeFigureOut">
               <a:rPr lang="en-US" smtClean="0"/>
-              <a:t>4/8/2019</a:t>
+              <a:t>4/9/2019</a:t>
             </a:fld>
             <a:endParaRPr lang="en-US"/>
           </a:p>
@@ -5805,7 +5973,7 @@
           <a:p>
             <a:fld id="{439CE6F7-9533-4255-A38D-1E6294581F5A}" type="datetimeFigureOut">
               <a:rPr lang="en-US" smtClean="0"/>
-              <a:t>4/8/2019</a:t>
+              <a:t>4/9/2019</a:t>
             </a:fld>
             <a:endParaRPr lang="en-US"/>
           </a:p>
@@ -6046,7 +6214,7 @@
           <a:p>
             <a:fld id="{439CE6F7-9533-4255-A38D-1E6294581F5A}" type="datetimeFigureOut">
               <a:rPr lang="en-US" smtClean="0"/>
-              <a:t>4/8/2019</a:t>
+              <a:t>4/9/2019</a:t>
             </a:fld>
             <a:endParaRPr lang="en-US"/>
           </a:p>
@@ -6778,7 +6946,7 @@
         </p:nvSpPr>
         <p:spPr>
           <a:xfrm>
-            <a:off x="1098311" y="6276305"/>
+            <a:off x="1196907" y="6614133"/>
             <a:ext cx="9526146" cy="280737"/>
           </a:xfrm>
         </p:spPr>
@@ -6941,7 +7109,7 @@
                 <a:ea typeface="Lato" panose="020F0502020204030203" pitchFamily="34" charset="0"/>
                 <a:cs typeface="Lato" panose="020F0502020204030203" pitchFamily="34" charset="0"/>
               </a:rPr>
-              <a:t>X </a:t>
+              <a:t>x</a:t>
             </a:r>
             <a:endParaRPr lang="en-US" sz="900" dirty="0">
               <a:solidFill>
@@ -7172,7 +7340,7 @@
               </a:solidFill>
               <a:ln w="9525">
                 <a:solidFill>
-                  <a:srgbClr val="FF66FF"/>
+                  <a:srgbClr val="FE9B50"/>
                 </a:solidFill>
               </a:ln>
             </p:spPr>
@@ -7211,7 +7379,7 @@
                       <m:r>
                         <a:rPr lang="en-US" i="1" smtClean="0">
                           <a:solidFill>
-                            <a:srgbClr val="FF66FF"/>
+                            <a:srgbClr val="FE9B50"/>
                           </a:solidFill>
                           <a:latin typeface="Cambria Math" panose="02040503050406030204" pitchFamily="18" charset="0"/>
                           <a:ea typeface="Cambria Math" panose="02040503050406030204" pitchFamily="18" charset="0"/>
@@ -7223,7 +7391,7 @@
                 </a14:m>
                 <a:endParaRPr lang="en-US" dirty="0">
                   <a:solidFill>
-                    <a:srgbClr val="FF66FF"/>
+                    <a:srgbClr val="FE9B50"/>
                   </a:solidFill>
                 </a:endParaRPr>
               </a:p>
@@ -7261,7 +7429,7 @@
               </a:blipFill>
               <a:ln w="9525">
                 <a:solidFill>
-                  <a:srgbClr val="FF66FF"/>
+                  <a:srgbClr val="FE9B50"/>
                 </a:solidFill>
               </a:ln>
             </p:spPr>
@@ -7308,7 +7476,7 @@
           </a:solidFill>
           <a:ln w="9525">
             <a:solidFill>
-              <a:srgbClr val="FF66FF"/>
+              <a:srgbClr val="FE9B50"/>
             </a:solidFill>
           </a:ln>
         </p:spPr>
@@ -7341,7 +7509,7 @@
             <a:r>
               <a:rPr lang="el-GR" dirty="0">
                 <a:solidFill>
-                  <a:srgbClr val="FF66FF"/>
+                  <a:srgbClr val="FE9B50"/>
                 </a:solidFill>
                 <a:latin typeface="Lato" panose="020F0502020204030203" pitchFamily="34" charset="0"/>
                 <a:ea typeface="Lato" panose="020F0502020204030203" pitchFamily="34" charset="0"/>
@@ -7351,7 +7519,7 @@
             </a:r>
             <a:endParaRPr lang="en-US" dirty="0">
               <a:solidFill>
-                <a:srgbClr val="FF66FF"/>
+                <a:srgbClr val="FE9B50"/>
               </a:solidFill>
               <a:latin typeface="Lato" panose="020F0502020204030203" pitchFamily="34" charset="0"/>
               <a:ea typeface="Lato" panose="020F0502020204030203" pitchFamily="34" charset="0"/>
@@ -7433,7 +7601,7 @@
               <a:noFill/>
               <a:ln w="6350">
                 <a:solidFill>
-                  <a:srgbClr val="FF66FF"/>
+                  <a:srgbClr val="FE9B50"/>
                 </a:solidFill>
                 <a:prstDash val="solid"/>
               </a:ln>
@@ -7456,7 +7624,7 @@
                           <m:ctrlPr>
                             <a:rPr lang="en-US" sz="1600" i="1" smtClean="0">
                               <a:solidFill>
-                                <a:srgbClr val="FF66FF"/>
+                                <a:srgbClr val="FE9B50"/>
                               </a:solidFill>
                               <a:latin typeface="Cambria Math" panose="02040503050406030204" pitchFamily="18" charset="0"/>
                               <a:ea typeface="Lato" panose="020F0502020204030203" pitchFamily="34" charset="0"/>
@@ -7468,7 +7636,7 @@
                           <m:r>
                             <a:rPr lang="en-US" sz="1600" i="1">
                               <a:solidFill>
-                                <a:srgbClr val="FF66FF"/>
+                                <a:srgbClr val="FE9B50"/>
                               </a:solidFill>
                               <a:latin typeface="Cambria Math" panose="02040503050406030204" pitchFamily="18" charset="0"/>
                               <a:ea typeface="Lato" panose="020F0502020204030203" pitchFamily="34" charset="0"/>
@@ -7479,22 +7647,33 @@
                         </m:e>
                         <m:sub>
                           <m:r>
-                            <a:rPr lang="en-US" sz="1600" i="1">
+                            <a:rPr lang="en-US" sz="1600" b="0" i="1" smtClean="0">
                               <a:solidFill>
-                                <a:srgbClr val="FF66FF"/>
+                                <a:srgbClr val="FE9B50"/>
                               </a:solidFill>
                               <a:latin typeface="Cambria Math" panose="02040503050406030204" pitchFamily="18" charset="0"/>
                               <a:ea typeface="Lato" panose="020F0502020204030203" pitchFamily="34" charset="0"/>
                               <a:cs typeface="Lato" panose="020F0502020204030203" pitchFamily="34" charset="0"/>
                             </a:rPr>
-                            <m:t>𝑓h</m:t>
+                            <m:t>h</m:t>
+                          </m:r>
+                          <m:r>
+                            <a:rPr lang="en-US" sz="1600" i="1">
+                              <a:solidFill>
+                                <a:srgbClr val="FE9B50"/>
+                              </a:solidFill>
+                              <a:latin typeface="Cambria Math" panose="02040503050406030204" pitchFamily="18" charset="0"/>
+                              <a:ea typeface="Lato" panose="020F0502020204030203" pitchFamily="34" charset="0"/>
+                              <a:cs typeface="Lato" panose="020F0502020204030203" pitchFamily="34" charset="0"/>
+                            </a:rPr>
+                            <m:t>𝑓</m:t>
                           </m:r>
                         </m:sub>
                       </m:sSub>
                       <m:r>
                         <a:rPr lang="en-US" sz="1600" i="1">
                           <a:solidFill>
-                            <a:srgbClr val="FF66FF"/>
+                            <a:srgbClr val="FE9B50"/>
                           </a:solidFill>
                           <a:latin typeface="Cambria Math" panose="02040503050406030204" pitchFamily="18" charset="0"/>
                           <a:ea typeface="Cambria Math" panose="02040503050406030204" pitchFamily="18" charset="0"/>
@@ -7505,7 +7684,7 @@
                       <m:r>
                         <a:rPr lang="en-US" sz="1600" i="1">
                           <a:solidFill>
-                            <a:srgbClr val="FF66FF"/>
+                            <a:srgbClr val="FE9B50"/>
                           </a:solidFill>
                           <a:latin typeface="Cambria Math" panose="02040503050406030204" pitchFamily="18" charset="0"/>
                           <a:ea typeface="Cambria Math" panose="02040503050406030204" pitchFamily="18" charset="0"/>
@@ -7516,7 +7695,7 @@
                       <m:r>
                         <a:rPr lang="en-US" sz="1600" i="1">
                           <a:solidFill>
-                            <a:srgbClr val="FF66FF"/>
+                            <a:srgbClr val="FE9B50"/>
                           </a:solidFill>
                           <a:latin typeface="Cambria Math" panose="02040503050406030204" pitchFamily="18" charset="0"/>
                           <a:ea typeface="Lato" panose="020F0502020204030203" pitchFamily="34" charset="0"/>
@@ -7529,7 +7708,7 @@
                           <m:ctrlPr>
                             <a:rPr lang="en-US" sz="1600" i="1">
                               <a:solidFill>
-                                <a:srgbClr val="FF66FF"/>
+                                <a:srgbClr val="FE9B50"/>
                               </a:solidFill>
                               <a:latin typeface="Cambria Math" panose="02040503050406030204" pitchFamily="18" charset="0"/>
                               <a:ea typeface="Cambria Math" panose="02040503050406030204" pitchFamily="18" charset="0"/>
@@ -7541,7 +7720,7 @@
                           <m:r>
                             <a:rPr lang="en-US" sz="1600" i="1">
                               <a:solidFill>
-                                <a:srgbClr val="FF66FF"/>
+                                <a:srgbClr val="FE9B50"/>
                               </a:solidFill>
                               <a:latin typeface="Cambria Math" panose="02040503050406030204" pitchFamily="18" charset="0"/>
                               <a:ea typeface="Cambria Math" panose="02040503050406030204" pitchFamily="18" charset="0"/>
@@ -7554,13 +7733,24 @@
                           <m:r>
                             <a:rPr lang="en-US" sz="1600" i="1">
                               <a:solidFill>
-                                <a:srgbClr val="FF66FF"/>
+                                <a:srgbClr val="FE9B50"/>
                               </a:solidFill>
                               <a:latin typeface="Cambria Math" panose="02040503050406030204" pitchFamily="18" charset="0"/>
                               <a:ea typeface="Cambria Math" panose="02040503050406030204" pitchFamily="18" charset="0"/>
                               <a:cs typeface="Lato" panose="020F0502020204030203" pitchFamily="34" charset="0"/>
                             </a:rPr>
-                            <m:t>𝑓h</m:t>
+                            <m:t>h</m:t>
+                          </m:r>
+                          <m:r>
+                            <a:rPr lang="en-US" sz="1600" b="0" i="1" smtClean="0">
+                              <a:solidFill>
+                                <a:srgbClr val="FE9B50"/>
+                              </a:solidFill>
+                              <a:latin typeface="Cambria Math" panose="02040503050406030204" pitchFamily="18" charset="0"/>
+                              <a:ea typeface="Cambria Math" panose="02040503050406030204" pitchFamily="18" charset="0"/>
+                              <a:cs typeface="Lato" panose="020F0502020204030203" pitchFamily="34" charset="0"/>
+                            </a:rPr>
+                            <m:t>𝑓</m:t>
                           </m:r>
                         </m:sub>
                       </m:sSub>
@@ -7569,7 +7759,7 @@
                 </a14:m>
                 <a:endParaRPr lang="en-US" sz="1600" dirty="0">
                   <a:solidFill>
-                    <a:srgbClr val="FF66FF"/>
+                    <a:srgbClr val="FE9B50"/>
                   </a:solidFill>
                   <a:latin typeface="Lato" panose="020F0502020204030203" pitchFamily="34" charset="0"/>
                   <a:ea typeface="Lato" panose="020F0502020204030203" pitchFamily="34" charset="0"/>
@@ -7605,12 +7795,12 @@
               <a:blipFill>
                 <a:blip r:embed="rId4"/>
                 <a:stretch>
-                  <a:fillRect l="-8411" r="-6542" b="-7692"/>
+                  <a:fillRect l="-9346" r="-7477" b="-7692"/>
                 </a:stretch>
               </a:blipFill>
               <a:ln w="6350">
                 <a:solidFill>
-                  <a:srgbClr val="FF66FF"/>
+                  <a:srgbClr val="FE9B50"/>
                 </a:solidFill>
                 <a:prstDash val="solid"/>
               </a:ln>
@@ -7701,9 +7891,9 @@
               <a:noFill/>
               <a:ln w="9525">
                 <a:solidFill>
-                  <a:srgbClr val="FF66FF"/>
+                  <a:srgbClr val="FE9B50"/>
                 </a:solidFill>
-                <a:prstDash val="dash"/>
+                <a:prstDash val="solid"/>
               </a:ln>
             </p:spPr>
             <p:txBody>
@@ -7724,7 +7914,7 @@
                           <m:ctrlPr>
                             <a:rPr lang="en-US" sz="1600" i="1" smtClean="0">
                               <a:solidFill>
-                                <a:srgbClr val="FF66FF"/>
+                                <a:srgbClr val="FE9B50"/>
                               </a:solidFill>
                               <a:latin typeface="Cambria Math" panose="02040503050406030204" pitchFamily="18" charset="0"/>
                               <a:ea typeface="Lato" panose="020F0502020204030203" pitchFamily="34" charset="0"/>
@@ -7736,7 +7926,7 @@
                           <m:r>
                             <a:rPr lang="en-US" sz="1600" i="1">
                               <a:solidFill>
-                                <a:srgbClr val="FF66FF"/>
+                                <a:srgbClr val="FE9B50"/>
                               </a:solidFill>
                               <a:latin typeface="Cambria Math" panose="02040503050406030204" pitchFamily="18" charset="0"/>
                               <a:ea typeface="Lato" panose="020F0502020204030203" pitchFamily="34" charset="0"/>
@@ -7749,20 +7939,31 @@
                           <m:r>
                             <a:rPr lang="en-US" sz="1600" i="1">
                               <a:solidFill>
-                                <a:srgbClr val="FF66FF"/>
+                                <a:srgbClr val="FE9B50"/>
                               </a:solidFill>
                               <a:latin typeface="Cambria Math" panose="02040503050406030204" pitchFamily="18" charset="0"/>
                               <a:ea typeface="Lato" panose="020F0502020204030203" pitchFamily="34" charset="0"/>
                               <a:cs typeface="Lato" panose="020F0502020204030203" pitchFamily="34" charset="0"/>
                             </a:rPr>
-                            <m:t>𝑓𝑥</m:t>
+                            <m:t>𝑥</m:t>
+                          </m:r>
+                          <m:r>
+                            <a:rPr lang="en-US" sz="1600" b="0" i="1" smtClean="0">
+                              <a:solidFill>
+                                <a:srgbClr val="FE9B50"/>
+                              </a:solidFill>
+                              <a:latin typeface="Cambria Math" panose="02040503050406030204" pitchFamily="18" charset="0"/>
+                              <a:ea typeface="Lato" panose="020F0502020204030203" pitchFamily="34" charset="0"/>
+                              <a:cs typeface="Lato" panose="020F0502020204030203" pitchFamily="34" charset="0"/>
+                            </a:rPr>
+                            <m:t>𝑓</m:t>
                           </m:r>
                         </m:sub>
                       </m:sSub>
                       <m:r>
                         <a:rPr lang="en-US" sz="1600" i="1">
                           <a:solidFill>
-                            <a:srgbClr val="FF66FF"/>
+                            <a:srgbClr val="FE9B50"/>
                           </a:solidFill>
                           <a:latin typeface="Cambria Math" panose="02040503050406030204" pitchFamily="18" charset="0"/>
                           <a:ea typeface="Cambria Math" panose="02040503050406030204" pitchFamily="18" charset="0"/>
@@ -7771,20 +7972,20 @@
                         <m:t>∙</m:t>
                       </m:r>
                       <m:r>
-                        <a:rPr lang="en-US" sz="1600" i="1">
+                        <a:rPr lang="en-US" sz="1600" b="0" i="1" smtClean="0">
                           <a:solidFill>
-                            <a:srgbClr val="FF66FF"/>
+                            <a:srgbClr val="FE9B50"/>
                           </a:solidFill>
                           <a:latin typeface="Cambria Math" panose="02040503050406030204" pitchFamily="18" charset="0"/>
                           <a:ea typeface="Cambria Math" panose="02040503050406030204" pitchFamily="18" charset="0"/>
                           <a:cs typeface="Lato" panose="020F0502020204030203" pitchFamily="34" charset="0"/>
                         </a:rPr>
-                        <m:t>𝑋</m:t>
+                        <m:t>𝑥</m:t>
                       </m:r>
                       <m:r>
                         <a:rPr lang="en-US" sz="1600" i="1">
                           <a:solidFill>
-                            <a:srgbClr val="FF66FF"/>
+                            <a:srgbClr val="FE9B50"/>
                           </a:solidFill>
                           <a:latin typeface="Cambria Math" panose="02040503050406030204" pitchFamily="18" charset="0"/>
                           <a:ea typeface="Lato" panose="020F0502020204030203" pitchFamily="34" charset="0"/>
@@ -7797,7 +7998,7 @@
                           <m:ctrlPr>
                             <a:rPr lang="en-US" sz="1600" i="1">
                               <a:solidFill>
-                                <a:srgbClr val="FF66FF"/>
+                                <a:srgbClr val="FE9B50"/>
                               </a:solidFill>
                               <a:latin typeface="Cambria Math" panose="02040503050406030204" pitchFamily="18" charset="0"/>
                               <a:ea typeface="Cambria Math" panose="02040503050406030204" pitchFamily="18" charset="0"/>
@@ -7809,7 +8010,7 @@
                           <m:r>
                             <a:rPr lang="en-US" sz="1600" i="1">
                               <a:solidFill>
-                                <a:srgbClr val="FF66FF"/>
+                                <a:srgbClr val="FE9B50"/>
                               </a:solidFill>
                               <a:latin typeface="Cambria Math" panose="02040503050406030204" pitchFamily="18" charset="0"/>
                               <a:ea typeface="Cambria Math" panose="02040503050406030204" pitchFamily="18" charset="0"/>
@@ -7822,13 +8023,24 @@
                           <m:r>
                             <a:rPr lang="en-US" sz="1600" i="1">
                               <a:solidFill>
-                                <a:srgbClr val="FF66FF"/>
+                                <a:srgbClr val="FE9B50"/>
                               </a:solidFill>
                               <a:latin typeface="Cambria Math" panose="02040503050406030204" pitchFamily="18" charset="0"/>
                               <a:ea typeface="Cambria Math" panose="02040503050406030204" pitchFamily="18" charset="0"/>
                               <a:cs typeface="Lato" panose="020F0502020204030203" pitchFamily="34" charset="0"/>
                             </a:rPr>
-                            <m:t>𝑓𝑥</m:t>
+                            <m:t>𝑥</m:t>
+                          </m:r>
+                          <m:r>
+                            <a:rPr lang="en-US" sz="1600" b="0" i="1" smtClean="0">
+                              <a:solidFill>
+                                <a:srgbClr val="FE9B50"/>
+                              </a:solidFill>
+                              <a:latin typeface="Cambria Math" panose="02040503050406030204" pitchFamily="18" charset="0"/>
+                              <a:ea typeface="Cambria Math" panose="02040503050406030204" pitchFamily="18" charset="0"/>
+                              <a:cs typeface="Lato" panose="020F0502020204030203" pitchFamily="34" charset="0"/>
+                            </a:rPr>
+                            <m:t>𝑓</m:t>
                           </m:r>
                         </m:sub>
                       </m:sSub>
@@ -7837,7 +8049,7 @@
                 </a14:m>
                 <a:endParaRPr lang="en-US" sz="1600" dirty="0">
                   <a:solidFill>
-                    <a:srgbClr val="FF66FF"/>
+                    <a:srgbClr val="FE9B50"/>
                   </a:solidFill>
                   <a:latin typeface="Lato" panose="020F0502020204030203" pitchFamily="34" charset="0"/>
                   <a:ea typeface="Lato" panose="020F0502020204030203" pitchFamily="34" charset="0"/>
@@ -7873,14 +8085,14 @@
               <a:blipFill>
                 <a:blip r:embed="rId5"/>
                 <a:stretch>
-                  <a:fillRect l="-8333" r="-7407" b="-7609"/>
+                  <a:fillRect l="-7407" r="-4630" b="-7609"/>
                 </a:stretch>
               </a:blipFill>
               <a:ln w="9525">
                 <a:solidFill>
-                  <a:srgbClr val="FF66FF"/>
+                  <a:srgbClr val="FE9B50"/>
                 </a:solidFill>
-                <a:prstDash val="dash"/>
+                <a:prstDash val="solid"/>
               </a:ln>
             </p:spPr>
             <p:txBody>
@@ -7976,7 +8188,7 @@
             <a:solidFill>
               <a:schemeClr val="bg1"/>
             </a:solidFill>
-            <a:prstDash val="dash"/>
+            <a:prstDash val="solid"/>
           </a:ln>
         </p:spPr>
         <p:style>
@@ -8153,7 +8365,7 @@
             <p:spPr>
               <a:xfrm>
                 <a:off x="6130118" y="3145694"/>
-                <a:ext cx="644890" cy="548640"/>
+                <a:ext cx="644890" cy="505267"/>
               </a:xfrm>
               <a:prstGeom prst="rect">
                 <a:avLst/>
@@ -8182,7 +8394,7 @@
                       <m:sSub>
                         <m:sSubPr>
                           <m:ctrlPr>
-                            <a:rPr lang="en-US" sz="1600" i="1">
+                            <a:rPr lang="en-US" sz="1600" i="1" smtClean="0">
                               <a:solidFill>
                                 <a:srgbClr val="4AE719"/>
                               </a:solidFill>
@@ -8215,7 +8427,18 @@
                               <a:ea typeface="Lato" panose="020F0502020204030203" pitchFamily="34" charset="0"/>
                               <a:cs typeface="Lato" panose="020F0502020204030203" pitchFamily="34" charset="0"/>
                             </a:rPr>
-                            <m:t>𝑖h</m:t>
+                            <m:t>h</m:t>
+                          </m:r>
+                          <m:r>
+                            <a:rPr lang="en-US" sz="1600" b="0" i="1" smtClean="0">
+                              <a:solidFill>
+                                <a:srgbClr val="4AE719"/>
+                              </a:solidFill>
+                              <a:latin typeface="Cambria Math" panose="02040503050406030204" pitchFamily="18" charset="0"/>
+                              <a:ea typeface="Lato" panose="020F0502020204030203" pitchFamily="34" charset="0"/>
+                              <a:cs typeface="Lato" panose="020F0502020204030203" pitchFamily="34" charset="0"/>
+                            </a:rPr>
+                            <m:t>𝑖</m:t>
                           </m:r>
                         </m:sub>
                       </m:sSub>
@@ -8288,7 +8511,18 @@
                               <a:ea typeface="Cambria Math" panose="02040503050406030204" pitchFamily="18" charset="0"/>
                               <a:cs typeface="Lato" panose="020F0502020204030203" pitchFamily="34" charset="0"/>
                             </a:rPr>
-                            <m:t>𝑖h</m:t>
+                            <m:t>h</m:t>
+                          </m:r>
+                          <m:r>
+                            <a:rPr lang="en-US" sz="1600" b="0" i="1" smtClean="0">
+                              <a:solidFill>
+                                <a:srgbClr val="4AE719"/>
+                              </a:solidFill>
+                              <a:latin typeface="Cambria Math" panose="02040503050406030204" pitchFamily="18" charset="0"/>
+                              <a:ea typeface="Cambria Math" panose="02040503050406030204" pitchFamily="18" charset="0"/>
+                              <a:cs typeface="Lato" panose="020F0502020204030203" pitchFamily="34" charset="0"/>
+                            </a:rPr>
+                            <m:t>𝑖</m:t>
                           </m:r>
                         </m:sub>
                       </m:sSub>
@@ -8325,7 +8559,7 @@
             <p:spPr>
               <a:xfrm>
                 <a:off x="6130118" y="3145694"/>
-                <a:ext cx="644890" cy="548640"/>
+                <a:ext cx="644890" cy="505267"/>
               </a:xfrm>
               <a:prstGeom prst="rect">
                 <a:avLst/>
@@ -8333,7 +8567,7 @@
               <a:blipFill>
                 <a:blip r:embed="rId6"/>
                 <a:stretch>
-                  <a:fillRect l="-6604" r="-5660"/>
+                  <a:fillRect l="-6604" r="-5660" b="-4762"/>
                 </a:stretch>
               </a:blipFill>
               <a:ln w="6350">
@@ -8375,7 +8609,7 @@
             <p:spPr>
               <a:xfrm>
                 <a:off x="6841390" y="3147039"/>
-                <a:ext cx="644890" cy="548640"/>
+                <a:ext cx="644890" cy="505267"/>
               </a:xfrm>
               <a:prstGeom prst="rect">
                 <a:avLst/>
@@ -8385,7 +8619,7 @@
                 <a:solidFill>
                   <a:srgbClr val="4AE719"/>
                 </a:solidFill>
-                <a:prstDash val="dash"/>
+                <a:prstDash val="solid"/>
               </a:ln>
             </p:spPr>
             <p:txBody>
@@ -8404,7 +8638,7 @@
                       <m:sSub>
                         <m:sSubPr>
                           <m:ctrlPr>
-                            <a:rPr lang="en-US" sz="1600" i="1">
+                            <a:rPr lang="en-US" sz="1600" i="1" smtClean="0">
                               <a:solidFill>
                                 <a:srgbClr val="4AE719"/>
                               </a:solidFill>
@@ -8437,7 +8671,18 @@
                               <a:ea typeface="Lato" panose="020F0502020204030203" pitchFamily="34" charset="0"/>
                               <a:cs typeface="Lato" panose="020F0502020204030203" pitchFamily="34" charset="0"/>
                             </a:rPr>
-                            <m:t>𝑖𝑥</m:t>
+                            <m:t>𝑥</m:t>
+                          </m:r>
+                          <m:r>
+                            <a:rPr lang="en-US" sz="1600" b="0" i="1" smtClean="0">
+                              <a:solidFill>
+                                <a:srgbClr val="4AE719"/>
+                              </a:solidFill>
+                              <a:latin typeface="Cambria Math" panose="02040503050406030204" pitchFamily="18" charset="0"/>
+                              <a:ea typeface="Lato" panose="020F0502020204030203" pitchFamily="34" charset="0"/>
+                              <a:cs typeface="Lato" panose="020F0502020204030203" pitchFamily="34" charset="0"/>
+                            </a:rPr>
+                            <m:t>𝑖</m:t>
                           </m:r>
                         </m:sub>
                       </m:sSub>
@@ -8453,7 +8698,7 @@
                         <m:t>∙</m:t>
                       </m:r>
                       <m:r>
-                        <a:rPr lang="en-US" sz="1600" i="1">
+                        <a:rPr lang="en-US" sz="1600" b="0" i="1" smtClean="0">
                           <a:solidFill>
                             <a:srgbClr val="4AE719"/>
                           </a:solidFill>
@@ -8461,7 +8706,7 @@
                           <a:ea typeface="Cambria Math" panose="02040503050406030204" pitchFamily="18" charset="0"/>
                           <a:cs typeface="Lato" panose="020F0502020204030203" pitchFamily="34" charset="0"/>
                         </a:rPr>
-                        <m:t>𝑋</m:t>
+                        <m:t>𝑥</m:t>
                       </m:r>
                       <m:r>
                         <a:rPr lang="en-US" sz="1600" i="1">
@@ -8502,6 +8747,17 @@
                         </m:e>
                         <m:sub>
                           <m:r>
+                            <a:rPr lang="en-US" sz="1600" b="0" i="1" smtClean="0">
+                              <a:solidFill>
+                                <a:srgbClr val="4AE719"/>
+                              </a:solidFill>
+                              <a:latin typeface="Cambria Math" panose="02040503050406030204" pitchFamily="18" charset="0"/>
+                              <a:ea typeface="Cambria Math" panose="02040503050406030204" pitchFamily="18" charset="0"/>
+                              <a:cs typeface="Lato" panose="020F0502020204030203" pitchFamily="34" charset="0"/>
+                            </a:rPr>
+                            <m:t>𝑥</m:t>
+                          </m:r>
+                          <m:r>
                             <a:rPr lang="en-US" sz="1600" i="1">
                               <a:solidFill>
                                 <a:srgbClr val="4AE719"/>
@@ -8510,7 +8766,7 @@
                               <a:ea typeface="Cambria Math" panose="02040503050406030204" pitchFamily="18" charset="0"/>
                               <a:cs typeface="Lato" panose="020F0502020204030203" pitchFamily="34" charset="0"/>
                             </a:rPr>
-                            <m:t>𝑖𝑥</m:t>
+                            <m:t>𝑖</m:t>
                           </m:r>
                         </m:sub>
                       </m:sSub>
@@ -8547,7 +8803,7 @@
             <p:spPr>
               <a:xfrm>
                 <a:off x="6841390" y="3147039"/>
-                <a:ext cx="644890" cy="548640"/>
+                <a:ext cx="644890" cy="505267"/>
               </a:xfrm>
               <a:prstGeom prst="rect">
                 <a:avLst/>
@@ -8555,14 +8811,14 @@
               <a:blipFill>
                 <a:blip r:embed="rId7"/>
                 <a:stretch>
-                  <a:fillRect l="-6481" r="-5556"/>
+                  <a:fillRect l="-4630" r="-1852" b="-4706"/>
                 </a:stretch>
               </a:blipFill>
               <a:ln w="9525">
                 <a:solidFill>
                   <a:srgbClr val="4AE719"/>
                 </a:solidFill>
-                <a:prstDash val="dash"/>
+                <a:prstDash val="solid"/>
               </a:ln>
             </p:spPr>
             <p:txBody>
@@ -8597,7 +8853,7 @@
             <p:spPr>
               <a:xfrm>
                 <a:off x="7563768" y="3150296"/>
-                <a:ext cx="644890" cy="548640"/>
+                <a:ext cx="644890" cy="505267"/>
               </a:xfrm>
               <a:prstGeom prst="rect">
                 <a:avLst/>
@@ -8626,7 +8882,7 @@
                       <m:sSub>
                         <m:sSubPr>
                           <m:ctrlPr>
-                            <a:rPr lang="en-US" sz="1600" i="1">
+                            <a:rPr lang="en-US" sz="1600" i="1" smtClean="0">
                               <a:solidFill>
                                 <a:srgbClr val="4AE719"/>
                               </a:solidFill>
@@ -8659,7 +8915,18 @@
                               <a:ea typeface="Lato" panose="020F0502020204030203" pitchFamily="34" charset="0"/>
                               <a:cs typeface="Lato" panose="020F0502020204030203" pitchFamily="34" charset="0"/>
                             </a:rPr>
-                            <m:t>𝑖h</m:t>
+                            <m:t>h</m:t>
+                          </m:r>
+                          <m:r>
+                            <a:rPr lang="en-US" sz="1600" b="0" i="1" smtClean="0">
+                              <a:solidFill>
+                                <a:srgbClr val="4AE719"/>
+                              </a:solidFill>
+                              <a:latin typeface="Cambria Math" panose="02040503050406030204" pitchFamily="18" charset="0"/>
+                              <a:ea typeface="Lato" panose="020F0502020204030203" pitchFamily="34" charset="0"/>
+                              <a:cs typeface="Lato" panose="020F0502020204030203" pitchFamily="34" charset="0"/>
+                            </a:rPr>
+                            <m:t>𝑙</m:t>
                           </m:r>
                         </m:sub>
                       </m:sSub>
@@ -8732,7 +8999,18 @@
                               <a:ea typeface="Cambria Math" panose="02040503050406030204" pitchFamily="18" charset="0"/>
                               <a:cs typeface="Lato" panose="020F0502020204030203" pitchFamily="34" charset="0"/>
                             </a:rPr>
-                            <m:t>𝑖h</m:t>
+                            <m:t>h</m:t>
+                          </m:r>
+                          <m:r>
+                            <a:rPr lang="en-US" sz="1600" b="0" i="1" smtClean="0">
+                              <a:solidFill>
+                                <a:srgbClr val="4AE719"/>
+                              </a:solidFill>
+                              <a:latin typeface="Cambria Math" panose="02040503050406030204" pitchFamily="18" charset="0"/>
+                              <a:ea typeface="Cambria Math" panose="02040503050406030204" pitchFamily="18" charset="0"/>
+                              <a:cs typeface="Lato" panose="020F0502020204030203" pitchFamily="34" charset="0"/>
+                            </a:rPr>
+                            <m:t>𝑙</m:t>
                           </m:r>
                         </m:sub>
                       </m:sSub>
@@ -8769,7 +9047,7 @@
             <p:spPr>
               <a:xfrm>
                 <a:off x="7563768" y="3150296"/>
-                <a:ext cx="644890" cy="548640"/>
+                <a:ext cx="644890" cy="505267"/>
               </a:xfrm>
               <a:prstGeom prst="rect">
                 <a:avLst/>
@@ -8777,7 +9055,7 @@
               <a:blipFill>
                 <a:blip r:embed="rId8"/>
                 <a:stretch>
-                  <a:fillRect l="-6542" r="-4673"/>
+                  <a:fillRect l="-6542" r="-4673" b="-3571"/>
                 </a:stretch>
               </a:blipFill>
               <a:ln w="6350">
@@ -8819,7 +9097,7 @@
             <p:spPr>
               <a:xfrm>
                 <a:off x="8257462" y="3150889"/>
-                <a:ext cx="644890" cy="548640"/>
+                <a:ext cx="644890" cy="505267"/>
               </a:xfrm>
               <a:prstGeom prst="rect">
                 <a:avLst/>
@@ -8829,7 +9107,7 @@
                 <a:solidFill>
                   <a:srgbClr val="4AE719"/>
                 </a:solidFill>
-                <a:prstDash val="dash"/>
+                <a:prstDash val="solid"/>
               </a:ln>
             </p:spPr>
             <p:txBody>
@@ -8848,7 +9126,7 @@
                       <m:sSub>
                         <m:sSubPr>
                           <m:ctrlPr>
-                            <a:rPr lang="en-US" sz="1600" i="1">
+                            <a:rPr lang="en-US" sz="1600" i="1" smtClean="0">
                               <a:solidFill>
                                 <a:srgbClr val="4AE719"/>
                               </a:solidFill>
@@ -8873,7 +9151,7 @@
                         </m:e>
                         <m:sub>
                           <m:r>
-                            <a:rPr lang="en-US" sz="1600" i="1">
+                            <a:rPr lang="en-US" sz="1600" b="0" i="1" smtClean="0">
                               <a:solidFill>
                                 <a:srgbClr val="4AE719"/>
                               </a:solidFill>
@@ -8881,7 +9159,7 @@
                               <a:ea typeface="Lato" panose="020F0502020204030203" pitchFamily="34" charset="0"/>
                               <a:cs typeface="Lato" panose="020F0502020204030203" pitchFamily="34" charset="0"/>
                             </a:rPr>
-                            <m:t>𝑖𝑥</m:t>
+                            <m:t>𝑥𝑙</m:t>
                           </m:r>
                         </m:sub>
                       </m:sSub>
@@ -8897,7 +9175,7 @@
                         <m:t>∙</m:t>
                       </m:r>
                       <m:r>
-                        <a:rPr lang="en-US" sz="1600" i="1">
+                        <a:rPr lang="en-US" sz="1600" b="0" i="1" smtClean="0">
                           <a:solidFill>
                             <a:srgbClr val="4AE719"/>
                           </a:solidFill>
@@ -8905,7 +9183,7 @@
                           <a:ea typeface="Cambria Math" panose="02040503050406030204" pitchFamily="18" charset="0"/>
                           <a:cs typeface="Lato" panose="020F0502020204030203" pitchFamily="34" charset="0"/>
                         </a:rPr>
-                        <m:t>𝑋</m:t>
+                        <m:t>𝑥</m:t>
                       </m:r>
                       <m:r>
                         <a:rPr lang="en-US" sz="1600" i="1">
@@ -8954,7 +9232,18 @@
                               <a:ea typeface="Cambria Math" panose="02040503050406030204" pitchFamily="18" charset="0"/>
                               <a:cs typeface="Lato" panose="020F0502020204030203" pitchFamily="34" charset="0"/>
                             </a:rPr>
-                            <m:t>𝑖𝑥</m:t>
+                            <m:t>𝑥</m:t>
+                          </m:r>
+                          <m:r>
+                            <a:rPr lang="en-US" sz="1600" b="0" i="1" smtClean="0">
+                              <a:solidFill>
+                                <a:srgbClr val="4AE719"/>
+                              </a:solidFill>
+                              <a:latin typeface="Cambria Math" panose="02040503050406030204" pitchFamily="18" charset="0"/>
+                              <a:ea typeface="Cambria Math" panose="02040503050406030204" pitchFamily="18" charset="0"/>
+                              <a:cs typeface="Lato" panose="020F0502020204030203" pitchFamily="34" charset="0"/>
+                            </a:rPr>
+                            <m:t>𝑙</m:t>
                           </m:r>
                         </m:sub>
                       </m:sSub>
@@ -8991,7 +9280,7 @@
             <p:spPr>
               <a:xfrm>
                 <a:off x="8257462" y="3150889"/>
-                <a:ext cx="644890" cy="548640"/>
+                <a:ext cx="644890" cy="505267"/>
               </a:xfrm>
               <a:prstGeom prst="rect">
                 <a:avLst/>
@@ -8999,14 +9288,14 @@
               <a:blipFill>
                 <a:blip r:embed="rId9"/>
                 <a:stretch>
-                  <a:fillRect l="-7477" r="-5607"/>
+                  <a:fillRect l="-5607" r="-1869" b="-3529"/>
                 </a:stretch>
               </a:blipFill>
               <a:ln w="9525">
                 <a:solidFill>
                   <a:srgbClr val="4AE719"/>
                 </a:solidFill>
-                <a:prstDash val="dash"/>
+                <a:prstDash val="solid"/>
               </a:ln>
             </p:spPr>
             <p:txBody>
@@ -9042,8 +9331,8 @@
         </p:nvCxnSpPr>
         <p:spPr>
           <a:xfrm rot="5400000" flipH="1" flipV="1">
-            <a:off x="5905149" y="3032787"/>
-            <a:ext cx="595793" cy="1921579"/>
+            <a:off x="5883462" y="3011100"/>
+            <a:ext cx="639166" cy="1921579"/>
           </a:xfrm>
           <a:prstGeom prst="bentConnector3">
             <a:avLst>
@@ -9090,8 +9379,8 @@
         </p:nvCxnSpPr>
         <p:spPr>
           <a:xfrm rot="5400000" flipH="1" flipV="1">
-            <a:off x="6615110" y="2326676"/>
-            <a:ext cx="591943" cy="3337651"/>
+            <a:off x="6593423" y="2304989"/>
+            <a:ext cx="635316" cy="3337651"/>
           </a:xfrm>
           <a:prstGeom prst="bentConnector3">
             <a:avLst>
@@ -9138,8 +9427,8 @@
         </p:nvCxnSpPr>
         <p:spPr>
           <a:xfrm flipV="1">
-            <a:off x="4311737" y="3694334"/>
-            <a:ext cx="2140826" cy="125961"/>
+            <a:off x="4311737" y="3650961"/>
+            <a:ext cx="2140826" cy="169334"/>
           </a:xfrm>
           <a:prstGeom prst="bentConnector2">
             <a:avLst/>
@@ -9184,8 +9473,8 @@
         </p:nvCxnSpPr>
         <p:spPr>
           <a:xfrm flipV="1">
-            <a:off x="4311737" y="3698936"/>
-            <a:ext cx="3574476" cy="121359"/>
+            <a:off x="4311737" y="3655563"/>
+            <a:ext cx="3574476" cy="164732"/>
           </a:xfrm>
           <a:prstGeom prst="bentConnector2">
             <a:avLst/>
@@ -9242,7 +9531,7 @@
             <a:solidFill>
               <a:schemeClr val="bg1"/>
             </a:solidFill>
-            <a:prstDash val="dash"/>
+            <a:prstDash val="solid"/>
           </a:ln>
         </p:spPr>
         <p:style>
@@ -9338,7 +9627,7 @@
             <a:solidFill>
               <a:schemeClr val="bg1"/>
             </a:solidFill>
-            <a:prstDash val="dash"/>
+            <a:prstDash val="solid"/>
           </a:ln>
         </p:spPr>
         <p:style>
@@ -9370,7 +9659,7 @@
         </p:nvSpPr>
         <p:spPr>
           <a:xfrm>
-            <a:off x="6667583" y="2337468"/>
+            <a:off x="6663764" y="2336370"/>
             <a:ext cx="270101" cy="248328"/>
           </a:xfrm>
           <a:prstGeom prst="rect">
@@ -9525,9 +9814,9 @@
           <p:nvPr/>
         </p:nvCxnSpPr>
         <p:spPr>
-          <a:xfrm flipV="1">
-            <a:off x="6799663" y="2585796"/>
-            <a:ext cx="2971" cy="102325"/>
+          <a:xfrm flipH="1" flipV="1">
+            <a:off x="6798815" y="2584698"/>
+            <a:ext cx="848" cy="103423"/>
           </a:xfrm>
           <a:prstGeom prst="straightConnector1">
             <a:avLst/>
@@ -9756,8 +10045,8 @@
         </p:nvCxnSpPr>
         <p:spPr>
           <a:xfrm rot="10800000" flipV="1">
-            <a:off x="6802635" y="2183438"/>
-            <a:ext cx="562521" cy="154030"/>
+            <a:off x="6798815" y="2183438"/>
+            <a:ext cx="566340" cy="152932"/>
           </a:xfrm>
           <a:prstGeom prst="bentConnector2">
             <a:avLst/>
@@ -9847,7 +10136,7 @@
             <p:spPr>
               <a:xfrm>
                 <a:off x="9086023" y="3143710"/>
-                <a:ext cx="644890" cy="548640"/>
+                <a:ext cx="644890" cy="505267"/>
               </a:xfrm>
               <a:prstGeom prst="rect">
                 <a:avLst/>
@@ -9876,7 +10165,7 @@
                       <m:sSub>
                         <m:sSubPr>
                           <m:ctrlPr>
-                            <a:rPr lang="en-US" sz="1600" i="1">
+                            <a:rPr lang="en-US" sz="1600" i="1" smtClean="0">
                               <a:solidFill>
                                 <a:srgbClr val="15D2FF"/>
                               </a:solidFill>
@@ -9909,7 +10198,18 @@
                               <a:ea typeface="Lato" panose="020F0502020204030203" pitchFamily="34" charset="0"/>
                               <a:cs typeface="Lato" panose="020F0502020204030203" pitchFamily="34" charset="0"/>
                             </a:rPr>
-                            <m:t>𝑖h</m:t>
+                            <m:t>h</m:t>
+                          </m:r>
+                          <m:r>
+                            <a:rPr lang="en-US" sz="1600" b="0" i="1" smtClean="0">
+                              <a:solidFill>
+                                <a:srgbClr val="15D2FF"/>
+                              </a:solidFill>
+                              <a:latin typeface="Cambria Math" panose="02040503050406030204" pitchFamily="18" charset="0"/>
+                              <a:ea typeface="Lato" panose="020F0502020204030203" pitchFamily="34" charset="0"/>
+                              <a:cs typeface="Lato" panose="020F0502020204030203" pitchFamily="34" charset="0"/>
+                            </a:rPr>
+                            <m:t>𝑜</m:t>
                           </m:r>
                         </m:sub>
                       </m:sSub>
@@ -9982,7 +10282,18 @@
                               <a:ea typeface="Cambria Math" panose="02040503050406030204" pitchFamily="18" charset="0"/>
                               <a:cs typeface="Lato" panose="020F0502020204030203" pitchFamily="34" charset="0"/>
                             </a:rPr>
-                            <m:t>𝑖h</m:t>
+                            <m:t>h</m:t>
+                          </m:r>
+                          <m:r>
+                            <a:rPr lang="en-US" sz="1600" b="0" i="1" smtClean="0">
+                              <a:solidFill>
+                                <a:srgbClr val="15D2FF"/>
+                              </a:solidFill>
+                              <a:latin typeface="Cambria Math" panose="02040503050406030204" pitchFamily="18" charset="0"/>
+                              <a:ea typeface="Cambria Math" panose="02040503050406030204" pitchFamily="18" charset="0"/>
+                              <a:cs typeface="Lato" panose="020F0502020204030203" pitchFamily="34" charset="0"/>
+                            </a:rPr>
+                            <m:t>𝑜</m:t>
                           </m:r>
                         </m:sub>
                       </m:sSub>
@@ -10019,7 +10330,7 @@
             <p:spPr>
               <a:xfrm>
                 <a:off x="9086023" y="3143710"/>
-                <a:ext cx="644890" cy="548640"/>
+                <a:ext cx="644890" cy="505267"/>
               </a:xfrm>
               <a:prstGeom prst="rect">
                 <a:avLst/>
@@ -10027,7 +10338,7 @@
               <a:blipFill>
                 <a:blip r:embed="rId11"/>
                 <a:stretch>
-                  <a:fillRect l="-5607" r="-4673"/>
+                  <a:fillRect l="-8411" r="-7477" b="-3571"/>
                 </a:stretch>
               </a:blipFill>
               <a:ln w="6350">
@@ -10069,7 +10380,7 @@
             <p:spPr>
               <a:xfrm>
                 <a:off x="9782873" y="3143710"/>
-                <a:ext cx="644890" cy="548640"/>
+                <a:ext cx="644890" cy="505267"/>
               </a:xfrm>
               <a:prstGeom prst="rect">
                 <a:avLst/>
@@ -10079,7 +10390,7 @@
                 <a:solidFill>
                   <a:srgbClr val="15D2FF"/>
                 </a:solidFill>
-                <a:prstDash val="dash"/>
+                <a:prstDash val="solid"/>
               </a:ln>
             </p:spPr>
             <p:txBody>
@@ -10098,7 +10409,7 @@
                       <m:sSub>
                         <m:sSubPr>
                           <m:ctrlPr>
-                            <a:rPr lang="en-US" sz="1600" i="1">
+                            <a:rPr lang="en-US" sz="1600" i="1" smtClean="0">
                               <a:solidFill>
                                 <a:srgbClr val="15D2FF"/>
                               </a:solidFill>
@@ -10131,7 +10442,18 @@
                               <a:ea typeface="Lato" panose="020F0502020204030203" pitchFamily="34" charset="0"/>
                               <a:cs typeface="Lato" panose="020F0502020204030203" pitchFamily="34" charset="0"/>
                             </a:rPr>
-                            <m:t>𝑖𝑥</m:t>
+                            <m:t>𝑥</m:t>
+                          </m:r>
+                          <m:r>
+                            <a:rPr lang="en-US" sz="1600" b="0" i="1" smtClean="0">
+                              <a:solidFill>
+                                <a:srgbClr val="15D2FF"/>
+                              </a:solidFill>
+                              <a:latin typeface="Cambria Math" panose="02040503050406030204" pitchFamily="18" charset="0"/>
+                              <a:ea typeface="Lato" panose="020F0502020204030203" pitchFamily="34" charset="0"/>
+                              <a:cs typeface="Lato" panose="020F0502020204030203" pitchFamily="34" charset="0"/>
+                            </a:rPr>
+                            <m:t>𝑜</m:t>
                           </m:r>
                         </m:sub>
                       </m:sSub>
@@ -10147,7 +10469,7 @@
                         <m:t>∙</m:t>
                       </m:r>
                       <m:r>
-                        <a:rPr lang="en-US" sz="1600" i="1">
+                        <a:rPr lang="en-US" sz="1600" b="0" i="1" smtClean="0">
                           <a:solidFill>
                             <a:srgbClr val="15D2FF"/>
                           </a:solidFill>
@@ -10155,7 +10477,7 @@
                           <a:ea typeface="Cambria Math" panose="02040503050406030204" pitchFamily="18" charset="0"/>
                           <a:cs typeface="Lato" panose="020F0502020204030203" pitchFamily="34" charset="0"/>
                         </a:rPr>
-                        <m:t>𝑋</m:t>
+                        <m:t>𝑥</m:t>
                       </m:r>
                       <m:r>
                         <a:rPr lang="en-US" sz="1600" i="1">
@@ -10204,7 +10526,18 @@
                               <a:ea typeface="Cambria Math" panose="02040503050406030204" pitchFamily="18" charset="0"/>
                               <a:cs typeface="Lato" panose="020F0502020204030203" pitchFamily="34" charset="0"/>
                             </a:rPr>
-                            <m:t>𝑖𝑥</m:t>
+                            <m:t>𝑥</m:t>
+                          </m:r>
+                          <m:r>
+                            <a:rPr lang="en-US" sz="1600" b="0" i="1" smtClean="0">
+                              <a:solidFill>
+                                <a:srgbClr val="15D2FF"/>
+                              </a:solidFill>
+                              <a:latin typeface="Cambria Math" panose="02040503050406030204" pitchFamily="18" charset="0"/>
+                              <a:ea typeface="Cambria Math" panose="02040503050406030204" pitchFamily="18" charset="0"/>
+                              <a:cs typeface="Lato" panose="020F0502020204030203" pitchFamily="34" charset="0"/>
+                            </a:rPr>
+                            <m:t>𝑜</m:t>
                           </m:r>
                         </m:sub>
                       </m:sSub>
@@ -10241,7 +10574,7 @@
             <p:spPr>
               <a:xfrm>
                 <a:off x="9782873" y="3143710"/>
-                <a:ext cx="644890" cy="548640"/>
+                <a:ext cx="644890" cy="505267"/>
               </a:xfrm>
               <a:prstGeom prst="rect">
                 <a:avLst/>
@@ -10249,14 +10582,14 @@
               <a:blipFill>
                 <a:blip r:embed="rId12"/>
                 <a:stretch>
-                  <a:fillRect l="-7407" r="-4630"/>
+                  <a:fillRect l="-6481" r="-1852" b="-1176"/>
                 </a:stretch>
               </a:blipFill>
               <a:ln w="9525">
                 <a:solidFill>
                   <a:srgbClr val="15D2FF"/>
                 </a:solidFill>
-                <a:prstDash val="dash"/>
+                <a:prstDash val="solid"/>
               </a:ln>
             </p:spPr>
             <p:txBody>
@@ -10352,7 +10685,7 @@
             <a:solidFill>
               <a:schemeClr val="bg1"/>
             </a:solidFill>
-            <a:prstDash val="dash"/>
+            <a:prstDash val="solid"/>
           </a:ln>
         </p:spPr>
         <p:style>
@@ -10516,8 +10849,8 @@
         </p:nvCxnSpPr>
         <p:spPr>
           <a:xfrm rot="5400000" flipH="1" flipV="1">
-            <a:off x="7374226" y="1560380"/>
-            <a:ext cx="599122" cy="4863062"/>
+            <a:off x="7352540" y="1538694"/>
+            <a:ext cx="642495" cy="4863062"/>
           </a:xfrm>
           <a:prstGeom prst="bentConnector3">
             <a:avLst>
@@ -10564,8 +10897,8 @@
         </p:nvCxnSpPr>
         <p:spPr>
           <a:xfrm flipV="1">
-            <a:off x="4311737" y="3692350"/>
-            <a:ext cx="5096731" cy="127945"/>
+            <a:off x="4311737" y="3648977"/>
+            <a:ext cx="5096731" cy="171318"/>
           </a:xfrm>
           <a:prstGeom prst="bentConnector2">
             <a:avLst/>
@@ -11408,7 +11741,7 @@
                 <a:ea typeface="Lato" panose="020F0502020204030203" pitchFamily="34" charset="0"/>
                 <a:cs typeface="Lato" panose="020F0502020204030203" pitchFamily="34" charset="0"/>
               </a:rPr>
-              <a:t>X </a:t>
+              <a:t>x</a:t>
             </a:r>
             <a:endParaRPr lang="en-US" sz="900" dirty="0">
               <a:solidFill>
@@ -11625,7 +11958,7 @@
                 <a:solidFill>
                   <a:srgbClr val="4AE719"/>
                 </a:solidFill>
-                <a:prstDash val="dash"/>
+                <a:prstDash val="solid"/>
               </a:ln>
             </p:spPr>
             <p:txBody>
@@ -11644,7 +11977,7 @@
                       <m:sSub>
                         <m:sSubPr>
                           <m:ctrlPr>
-                            <a:rPr lang="en-US" sz="1600" i="1">
+                            <a:rPr lang="en-US" sz="1600" i="1" smtClean="0">
                               <a:solidFill>
                                 <a:srgbClr val="4AE719"/>
                               </a:solidFill>
@@ -11669,7 +12002,7 @@
                         </m:e>
                         <m:sub>
                           <m:r>
-                            <a:rPr lang="en-US" sz="1600" i="1">
+                            <a:rPr lang="en-US" sz="1600" i="1" smtClean="0">
                               <a:solidFill>
                                 <a:srgbClr val="4AE719"/>
                               </a:solidFill>
@@ -11677,7 +12010,18 @@
                               <a:ea typeface="Lato" panose="020F0502020204030203" pitchFamily="34" charset="0"/>
                               <a:cs typeface="Lato" panose="020F0502020204030203" pitchFamily="34" charset="0"/>
                             </a:rPr>
-                            <m:t>𝑖𝑥</m:t>
+                            <m:t>𝑥</m:t>
+                          </m:r>
+                          <m:r>
+                            <a:rPr lang="en-US" sz="1600" b="0" i="1" smtClean="0">
+                              <a:solidFill>
+                                <a:srgbClr val="4AE719"/>
+                              </a:solidFill>
+                              <a:latin typeface="Cambria Math" panose="02040503050406030204" pitchFamily="18" charset="0"/>
+                              <a:ea typeface="Lato" panose="020F0502020204030203" pitchFamily="34" charset="0"/>
+                              <a:cs typeface="Lato" panose="020F0502020204030203" pitchFamily="34" charset="0"/>
+                            </a:rPr>
+                            <m:t>𝑖</m:t>
                           </m:r>
                         </m:sub>
                       </m:sSub>
@@ -11693,7 +12037,7 @@
                         <m:t>∙</m:t>
                       </m:r>
                       <m:r>
-                        <a:rPr lang="en-US" sz="1600" i="1">
+                        <a:rPr lang="en-US" sz="1600" b="0" i="1" smtClean="0">
                           <a:solidFill>
                             <a:srgbClr val="4AE719"/>
                           </a:solidFill>
@@ -11701,7 +12045,7 @@
                           <a:ea typeface="Cambria Math" panose="02040503050406030204" pitchFamily="18" charset="0"/>
                           <a:cs typeface="Lato" panose="020F0502020204030203" pitchFamily="34" charset="0"/>
                         </a:rPr>
-                        <m:t>𝑋</m:t>
+                        <m:t>𝑥</m:t>
                       </m:r>
                       <m:r>
                         <a:rPr lang="en-US" sz="1600" i="1">
@@ -11750,7 +12094,18 @@
                               <a:ea typeface="Cambria Math" panose="02040503050406030204" pitchFamily="18" charset="0"/>
                               <a:cs typeface="Lato" panose="020F0502020204030203" pitchFamily="34" charset="0"/>
                             </a:rPr>
-                            <m:t>𝑖𝑥</m:t>
+                            <m:t>𝑥</m:t>
+                          </m:r>
+                          <m:r>
+                            <a:rPr lang="en-US" sz="1600" b="0" i="1" smtClean="0">
+                              <a:solidFill>
+                                <a:srgbClr val="4AE719"/>
+                              </a:solidFill>
+                              <a:latin typeface="Cambria Math" panose="02040503050406030204" pitchFamily="18" charset="0"/>
+                              <a:ea typeface="Cambria Math" panose="02040503050406030204" pitchFamily="18" charset="0"/>
+                              <a:cs typeface="Lato" panose="020F0502020204030203" pitchFamily="34" charset="0"/>
+                            </a:rPr>
+                            <m:t>𝑖</m:t>
                           </m:r>
                         </m:sub>
                       </m:sSub>
@@ -11795,14 +12150,14 @@
               <a:blipFill>
                 <a:blip r:embed="rId15"/>
                 <a:stretch>
-                  <a:fillRect l="-6481" r="-5556" b="-4706"/>
+                  <a:fillRect l="-4630" r="-1852" b="-4706"/>
                 </a:stretch>
               </a:blipFill>
               <a:ln w="9525">
                 <a:solidFill>
                   <a:srgbClr val="4AE719"/>
                 </a:solidFill>
-                <a:prstDash val="dash"/>
+                <a:prstDash val="solid"/>
               </a:ln>
             </p:spPr>
             <p:txBody>
@@ -11847,7 +12202,7 @@
                 <a:solidFill>
                   <a:srgbClr val="4AE719"/>
                 </a:solidFill>
-                <a:prstDash val="dash"/>
+                <a:prstDash val="solid"/>
               </a:ln>
             </p:spPr>
             <p:txBody>
@@ -11891,6 +12246,17 @@
                         </m:e>
                         <m:sub>
                           <m:r>
+                            <a:rPr lang="en-US" sz="1600" i="1">
+                              <a:solidFill>
+                                <a:srgbClr val="4AE719"/>
+                              </a:solidFill>
+                              <a:latin typeface="Cambria Math" panose="02040503050406030204" pitchFamily="18" charset="0"/>
+                              <a:ea typeface="Lato" panose="020F0502020204030203" pitchFamily="34" charset="0"/>
+                              <a:cs typeface="Lato" panose="020F0502020204030203" pitchFamily="34" charset="0"/>
+                            </a:rPr>
+                            <m:t>𝑥</m:t>
+                          </m:r>
+                          <m:r>
                             <a:rPr lang="en-US" sz="1600" b="0" i="1" smtClean="0">
                               <a:solidFill>
                                 <a:srgbClr val="4AE719"/>
@@ -11900,17 +12266,6 @@
                               <a:cs typeface="Lato" panose="020F0502020204030203" pitchFamily="34" charset="0"/>
                             </a:rPr>
                             <m:t>𝑙</m:t>
-                          </m:r>
-                          <m:r>
-                            <a:rPr lang="en-US" sz="1600" i="1">
-                              <a:solidFill>
-                                <a:srgbClr val="4AE719"/>
-                              </a:solidFill>
-                              <a:latin typeface="Cambria Math" panose="02040503050406030204" pitchFamily="18" charset="0"/>
-                              <a:ea typeface="Lato" panose="020F0502020204030203" pitchFamily="34" charset="0"/>
-                              <a:cs typeface="Lato" panose="020F0502020204030203" pitchFamily="34" charset="0"/>
-                            </a:rPr>
-                            <m:t>𝑥</m:t>
                           </m:r>
                         </m:sub>
                       </m:sSub>
@@ -11926,7 +12281,7 @@
                         <m:t>∙</m:t>
                       </m:r>
                       <m:r>
-                        <a:rPr lang="en-US" sz="1600" i="1">
+                        <a:rPr lang="en-US" sz="1600" b="0" i="1" smtClean="0">
                           <a:solidFill>
                             <a:srgbClr val="4AE719"/>
                           </a:solidFill>
@@ -11934,7 +12289,7 @@
                           <a:ea typeface="Cambria Math" panose="02040503050406030204" pitchFamily="18" charset="0"/>
                           <a:cs typeface="Lato" panose="020F0502020204030203" pitchFamily="34" charset="0"/>
                         </a:rPr>
-                        <m:t>𝑋</m:t>
+                        <m:t>𝑥</m:t>
                       </m:r>
                       <m:r>
                         <a:rPr lang="en-US" sz="1600" i="1">
@@ -11975,6 +12330,17 @@
                         </m:e>
                         <m:sub>
                           <m:r>
+                            <a:rPr lang="en-US" sz="1600" i="1">
+                              <a:solidFill>
+                                <a:srgbClr val="4AE719"/>
+                              </a:solidFill>
+                              <a:latin typeface="Cambria Math" panose="02040503050406030204" pitchFamily="18" charset="0"/>
+                              <a:ea typeface="Cambria Math" panose="02040503050406030204" pitchFamily="18" charset="0"/>
+                              <a:cs typeface="Lato" panose="020F0502020204030203" pitchFamily="34" charset="0"/>
+                            </a:rPr>
+                            <m:t>𝑥</m:t>
+                          </m:r>
+                          <m:r>
                             <a:rPr lang="en-US" sz="1600" b="0" i="1" smtClean="0">
                               <a:solidFill>
                                 <a:srgbClr val="4AE719"/>
@@ -11984,17 +12350,6 @@
                               <a:cs typeface="Lato" panose="020F0502020204030203" pitchFamily="34" charset="0"/>
                             </a:rPr>
                             <m:t>𝑙</m:t>
-                          </m:r>
-                          <m:r>
-                            <a:rPr lang="en-US" sz="1600" i="1">
-                              <a:solidFill>
-                                <a:srgbClr val="4AE719"/>
-                              </a:solidFill>
-                              <a:latin typeface="Cambria Math" panose="02040503050406030204" pitchFamily="18" charset="0"/>
-                              <a:ea typeface="Cambria Math" panose="02040503050406030204" pitchFamily="18" charset="0"/>
-                              <a:cs typeface="Lato" panose="020F0502020204030203" pitchFamily="34" charset="0"/>
-                            </a:rPr>
-                            <m:t>𝑥</m:t>
                           </m:r>
                         </m:sub>
                       </m:sSub>
@@ -12039,14 +12394,14 @@
               <a:blipFill>
                 <a:blip r:embed="rId16"/>
                 <a:stretch>
-                  <a:fillRect l="-7407" r="-4630" b="-4706"/>
+                  <a:fillRect l="-5556" r="-926" b="-4706"/>
                 </a:stretch>
               </a:blipFill>
               <a:ln w="9525">
                 <a:solidFill>
                   <a:srgbClr val="4AE719"/>
                 </a:solidFill>
-                <a:prstDash val="dash"/>
+                <a:prstDash val="solid"/>
               </a:ln>
             </p:spPr>
             <p:txBody>
@@ -12661,7 +13016,7 @@
                 <a:solidFill>
                   <a:srgbClr val="15D2FF"/>
                 </a:solidFill>
-                <a:prstDash val="dash"/>
+                <a:prstDash val="solid"/>
               </a:ln>
             </p:spPr>
             <p:txBody>
@@ -12705,6 +13060,17 @@
                         </m:e>
                         <m:sub>
                           <m:r>
+                            <a:rPr lang="en-US" sz="1600" i="1">
+                              <a:solidFill>
+                                <a:srgbClr val="15D2FF"/>
+                              </a:solidFill>
+                              <a:latin typeface="Cambria Math" panose="02040503050406030204" pitchFamily="18" charset="0"/>
+                              <a:ea typeface="Lato" panose="020F0502020204030203" pitchFamily="34" charset="0"/>
+                              <a:cs typeface="Lato" panose="020F0502020204030203" pitchFamily="34" charset="0"/>
+                            </a:rPr>
+                            <m:t>𝑥</m:t>
+                          </m:r>
+                          <m:r>
                             <a:rPr lang="en-US" sz="1600" b="0" i="1" smtClean="0">
                               <a:solidFill>
                                 <a:srgbClr val="15D2FF"/>
@@ -12714,17 +13080,6 @@
                               <a:cs typeface="Lato" panose="020F0502020204030203" pitchFamily="34" charset="0"/>
                             </a:rPr>
                             <m:t>𝑜</m:t>
-                          </m:r>
-                          <m:r>
-                            <a:rPr lang="en-US" sz="1600" i="1">
-                              <a:solidFill>
-                                <a:srgbClr val="15D2FF"/>
-                              </a:solidFill>
-                              <a:latin typeface="Cambria Math" panose="02040503050406030204" pitchFamily="18" charset="0"/>
-                              <a:ea typeface="Lato" panose="020F0502020204030203" pitchFamily="34" charset="0"/>
-                              <a:cs typeface="Lato" panose="020F0502020204030203" pitchFamily="34" charset="0"/>
-                            </a:rPr>
-                            <m:t>𝑥</m:t>
                           </m:r>
                         </m:sub>
                       </m:sSub>
@@ -12740,7 +13095,7 @@
                         <m:t>∙</m:t>
                       </m:r>
                       <m:r>
-                        <a:rPr lang="en-US" sz="1600" i="1">
+                        <a:rPr lang="en-US" sz="1600" b="0" i="1" smtClean="0">
                           <a:solidFill>
                             <a:srgbClr val="15D2FF"/>
                           </a:solidFill>
@@ -12748,7 +13103,7 @@
                           <a:ea typeface="Cambria Math" panose="02040503050406030204" pitchFamily="18" charset="0"/>
                           <a:cs typeface="Lato" panose="020F0502020204030203" pitchFamily="34" charset="0"/>
                         </a:rPr>
-                        <m:t>𝑋</m:t>
+                        <m:t>𝑥</m:t>
                       </m:r>
                       <m:r>
                         <a:rPr lang="en-US" sz="1600" i="1">
@@ -12789,6 +13144,17 @@
                         </m:e>
                         <m:sub>
                           <m:r>
+                            <a:rPr lang="en-US" sz="1600" i="1">
+                              <a:solidFill>
+                                <a:srgbClr val="15D2FF"/>
+                              </a:solidFill>
+                              <a:latin typeface="Cambria Math" panose="02040503050406030204" pitchFamily="18" charset="0"/>
+                              <a:ea typeface="Cambria Math" panose="02040503050406030204" pitchFamily="18" charset="0"/>
+                              <a:cs typeface="Lato" panose="020F0502020204030203" pitchFamily="34" charset="0"/>
+                            </a:rPr>
+                            <m:t>𝑥</m:t>
+                          </m:r>
+                          <m:r>
                             <a:rPr lang="en-US" sz="1600" b="0" i="1" smtClean="0">
                               <a:solidFill>
                                 <a:srgbClr val="15D2FF"/>
@@ -12798,17 +13164,6 @@
                               <a:cs typeface="Lato" panose="020F0502020204030203" pitchFamily="34" charset="0"/>
                             </a:rPr>
                             <m:t>𝑜</m:t>
-                          </m:r>
-                          <m:r>
-                            <a:rPr lang="en-US" sz="1600" i="1">
-                              <a:solidFill>
-                                <a:srgbClr val="15D2FF"/>
-                              </a:solidFill>
-                              <a:latin typeface="Cambria Math" panose="02040503050406030204" pitchFamily="18" charset="0"/>
-                              <a:ea typeface="Cambria Math" panose="02040503050406030204" pitchFamily="18" charset="0"/>
-                              <a:cs typeface="Lato" panose="020F0502020204030203" pitchFamily="34" charset="0"/>
-                            </a:rPr>
-                            <m:t>𝑥</m:t>
                           </m:r>
                         </m:sub>
                       </m:sSub>
@@ -12853,14 +13208,14 @@
               <a:blipFill>
                 <a:blip r:embed="rId18"/>
                 <a:stretch>
-                  <a:fillRect l="-8333" r="-5556" b="-1176"/>
+                  <a:fillRect l="-6481" r="-1852" b="-1176"/>
                 </a:stretch>
               </a:blipFill>
               <a:ln w="9525">
                 <a:solidFill>
                   <a:srgbClr val="15D2FF"/>
                 </a:solidFill>
-                <a:prstDash val="dash"/>
+                <a:prstDash val="solid"/>
               </a:ln>
             </p:spPr>
             <p:txBody>
@@ -13684,7 +14039,7 @@
         </p:nvSpPr>
         <p:spPr>
           <a:xfrm>
-            <a:off x="7532738" y="5400266"/>
+            <a:off x="7532738" y="4570057"/>
             <a:ext cx="1063282" cy="274320"/>
           </a:xfrm>
           <a:prstGeom prst="rect">
@@ -13756,7 +14111,7 @@
         </p:nvSpPr>
         <p:spPr>
           <a:xfrm>
-            <a:off x="8694998" y="5393973"/>
+            <a:off x="8694998" y="4563764"/>
             <a:ext cx="1063283" cy="276999"/>
           </a:xfrm>
           <a:prstGeom prst="rect">
@@ -13765,7 +14120,7 @@
           <a:noFill/>
           <a:ln w="9525">
             <a:solidFill>
-              <a:srgbClr val="FF66FF"/>
+              <a:srgbClr val="FE9B50"/>
             </a:solidFill>
             <a:prstDash val="solid"/>
           </a:ln>
@@ -13779,7 +14134,7 @@
             <a:r>
               <a:rPr lang="en-US" sz="1200" dirty="0">
                 <a:solidFill>
-                  <a:srgbClr val="FF66FF"/>
+                  <a:srgbClr val="FE9B50"/>
                 </a:solidFill>
                 <a:latin typeface="Lato" panose="020F0502020204030203" pitchFamily="34" charset="0"/>
                 <a:ea typeface="Lato" panose="020F0502020204030203" pitchFamily="34" charset="0"/>
@@ -13804,7 +14159,7 @@
         </p:nvSpPr>
         <p:spPr>
           <a:xfrm>
-            <a:off x="9857259" y="5400266"/>
+            <a:off x="9857259" y="4570057"/>
             <a:ext cx="1063283" cy="276999"/>
           </a:xfrm>
           <a:prstGeom prst="rect">
@@ -14170,7 +14525,7 @@
         </p:nvCxnSpPr>
         <p:spPr>
           <a:xfrm>
-            <a:off x="7532738" y="5292363"/>
+            <a:off x="7532738" y="4462154"/>
             <a:ext cx="3387804" cy="0"/>
           </a:xfrm>
           <a:prstGeom prst="line">
@@ -14211,7 +14566,7 @@
         </p:nvSpPr>
         <p:spPr>
           <a:xfrm>
-            <a:off x="8982967" y="5207195"/>
+            <a:off x="8982967" y="4376986"/>
             <a:ext cx="487343" cy="171848"/>
           </a:xfrm>
           <a:prstGeom prst="roundRect">
@@ -14294,7 +14649,7 @@
               </a:solidFill>
               <a:ln w="9525">
                 <a:solidFill>
-                  <a:srgbClr val="FF66FF"/>
+                  <a:srgbClr val="FE9B50"/>
                 </a:solidFill>
               </a:ln>
             </p:spPr>
@@ -14333,7 +14688,7 @@
                       <m:r>
                         <a:rPr lang="en-US" i="1" smtClean="0">
                           <a:solidFill>
-                            <a:srgbClr val="FF66FF"/>
+                            <a:srgbClr val="FE9B50"/>
                           </a:solidFill>
                           <a:latin typeface="Cambria Math" panose="02040503050406030204" pitchFamily="18" charset="0"/>
                         </a:rPr>
@@ -14344,7 +14699,7 @@
                 </a14:m>
                 <a:endParaRPr lang="en-US" dirty="0">
                   <a:solidFill>
-                    <a:srgbClr val="FF66FF"/>
+                    <a:srgbClr val="FE9B50"/>
                   </a:solidFill>
                 </a:endParaRPr>
               </a:p>
@@ -14382,7 +14737,7 @@
               </a:blipFill>
               <a:ln w="9525">
                 <a:solidFill>
-                  <a:srgbClr val="FF66FF"/>
+                  <a:srgbClr val="FE9B50"/>
                 </a:solidFill>
               </a:ln>
             </p:spPr>
@@ -14812,6 +15167,1102 @@
           </p:sp>
         </mc:Fallback>
       </mc:AlternateContent>
+      <p:sp>
+        <p:nvSpPr>
+          <p:cNvPr id="105" name="TextBox 104">
+            <a:extLst>
+              <a:ext uri="{FF2B5EF4-FFF2-40B4-BE49-F238E27FC236}">
+                <a16:creationId xmlns:a16="http://schemas.microsoft.com/office/drawing/2014/main" id="{7965981A-6FAF-4F79-B354-4164777E16C3}"/>
+              </a:ext>
+            </a:extLst>
+          </p:cNvPr>
+          <p:cNvSpPr txBox="1"/>
+          <p:nvPr/>
+        </p:nvSpPr>
+        <p:spPr>
+          <a:xfrm>
+            <a:off x="7932005" y="4965001"/>
+            <a:ext cx="1850868" cy="276999"/>
+          </a:xfrm>
+          <a:prstGeom prst="rect">
+            <a:avLst/>
+          </a:prstGeom>
+          <a:noFill/>
+        </p:spPr>
+        <p:txBody>
+          <a:bodyPr wrap="square" lIns="0" rIns="0" rtlCol="0">
+            <a:spAutoFit/>
+          </a:bodyPr>
+          <a:lstStyle/>
+          <a:p>
+            <a:r>
+              <a:rPr lang="en-US" sz="1200" i="1" dirty="0">
+                <a:solidFill>
+                  <a:schemeClr val="bg1">
+                    <a:lumMod val="85000"/>
+                  </a:schemeClr>
+                </a:solidFill>
+              </a:rPr>
+              <a:t>Element-wise multiplication</a:t>
+            </a:r>
+          </a:p>
+        </p:txBody>
+      </p:sp>
+      <p:cxnSp>
+        <p:nvCxnSpPr>
+          <p:cNvPr id="122" name="Straight Connector 22">
+            <a:extLst>
+              <a:ext uri="{FF2B5EF4-FFF2-40B4-BE49-F238E27FC236}">
+                <a16:creationId xmlns:a16="http://schemas.microsoft.com/office/drawing/2014/main" id="{181831D0-BBFB-42B6-B42A-7DAA17D08530}"/>
+              </a:ext>
+            </a:extLst>
+          </p:cNvPr>
+          <p:cNvCxnSpPr>
+            <a:cxnSpLocks/>
+          </p:cNvCxnSpPr>
+          <p:nvPr/>
+        </p:nvCxnSpPr>
+        <p:spPr>
+          <a:xfrm>
+            <a:off x="7551500" y="5383360"/>
+            <a:ext cx="240301" cy="1"/>
+          </a:xfrm>
+          <a:prstGeom prst="straightConnector1">
+            <a:avLst/>
+          </a:prstGeom>
+          <a:ln w="12700">
+            <a:solidFill>
+              <a:schemeClr val="bg1"/>
+            </a:solidFill>
+            <a:prstDash val="solid"/>
+            <a:headEnd type="none"/>
+            <a:tailEnd type="none" w="sm" len="sm"/>
+          </a:ln>
+        </p:spPr>
+        <p:style>
+          <a:lnRef idx="1">
+            <a:schemeClr val="accent1"/>
+          </a:lnRef>
+          <a:fillRef idx="0">
+            <a:schemeClr val="accent1"/>
+          </a:fillRef>
+          <a:effectRef idx="0">
+            <a:schemeClr val="accent1"/>
+          </a:effectRef>
+          <a:fontRef idx="minor">
+            <a:schemeClr val="tx1"/>
+          </a:fontRef>
+        </p:style>
+      </p:cxnSp>
+      <p:sp>
+        <p:nvSpPr>
+          <p:cNvPr id="123" name="Rectangle 122">
+            <a:extLst>
+              <a:ext uri="{FF2B5EF4-FFF2-40B4-BE49-F238E27FC236}">
+                <a16:creationId xmlns:a16="http://schemas.microsoft.com/office/drawing/2014/main" id="{9965DE44-1FA4-4412-99FC-70516A925C96}"/>
+              </a:ext>
+            </a:extLst>
+          </p:cNvPr>
+          <p:cNvSpPr/>
+          <p:nvPr/>
+        </p:nvSpPr>
+        <p:spPr>
+          <a:xfrm>
+            <a:off x="7808593" y="5247724"/>
+            <a:ext cx="822085" cy="276999"/>
+          </a:xfrm>
+          <a:prstGeom prst="rect">
+            <a:avLst/>
+          </a:prstGeom>
+        </p:spPr>
+        <p:txBody>
+          <a:bodyPr wrap="none">
+            <a:spAutoFit/>
+          </a:bodyPr>
+          <a:lstStyle/>
+          <a:p>
+            <a:r>
+              <a:rPr lang="en-US" sz="1200" dirty="0">
+                <a:solidFill>
+                  <a:schemeClr val="bg1">
+                    <a:lumMod val="85000"/>
+                  </a:schemeClr>
+                </a:solidFill>
+              </a:rPr>
+              <a:t> </a:t>
+            </a:r>
+            <a:r>
+              <a:rPr lang="en-US" sz="1200" i="1" dirty="0">
+                <a:solidFill>
+                  <a:schemeClr val="bg1">
+                    <a:lumMod val="85000"/>
+                  </a:schemeClr>
+                </a:solidFill>
+              </a:rPr>
+              <a:t>Size: (h,1)</a:t>
+            </a:r>
+            <a:endParaRPr lang="en-US" sz="1200" dirty="0">
+              <a:solidFill>
+                <a:schemeClr val="bg1">
+                  <a:lumMod val="85000"/>
+                </a:schemeClr>
+              </a:solidFill>
+            </a:endParaRPr>
+          </a:p>
+        </p:txBody>
+      </p:sp>
+      <p:grpSp>
+        <p:nvGrpSpPr>
+          <p:cNvPr id="30" name="Group 29">
+            <a:extLst>
+              <a:ext uri="{FF2B5EF4-FFF2-40B4-BE49-F238E27FC236}">
+                <a16:creationId xmlns:a16="http://schemas.microsoft.com/office/drawing/2014/main" id="{9CE132CB-6648-4E3C-B024-7DDC83F4F79F}"/>
+              </a:ext>
+            </a:extLst>
+          </p:cNvPr>
+          <p:cNvGrpSpPr/>
+          <p:nvPr/>
+        </p:nvGrpSpPr>
+        <p:grpSpPr>
+          <a:xfrm>
+            <a:off x="7420729" y="5744846"/>
+            <a:ext cx="1457494" cy="570540"/>
+            <a:chOff x="9476633" y="5547671"/>
+            <a:chExt cx="1457494" cy="570540"/>
+          </a:xfrm>
+        </p:grpSpPr>
+        <mc:AlternateContent xmlns:mc="http://schemas.openxmlformats.org/markup-compatibility/2006" xmlns:a14="http://schemas.microsoft.com/office/drawing/2010/main">
+          <mc:Choice Requires="a14">
+            <p:sp>
+              <p:nvSpPr>
+                <p:cNvPr id="111" name="Rectangle 110">
+                  <a:extLst>
+                    <a:ext uri="{FF2B5EF4-FFF2-40B4-BE49-F238E27FC236}">
+                      <a16:creationId xmlns:a16="http://schemas.microsoft.com/office/drawing/2014/main" id="{0F68B877-3413-4A8F-BE36-CF72CEFBDF33}"/>
+                    </a:ext>
+                  </a:extLst>
+                </p:cNvPr>
+                <p:cNvSpPr/>
+                <p:nvPr/>
+              </p:nvSpPr>
+              <p:spPr>
+                <a:xfrm>
+                  <a:off x="9476633" y="5547671"/>
+                  <a:ext cx="829394" cy="295081"/>
+                </a:xfrm>
+                <a:prstGeom prst="rect">
+                  <a:avLst/>
+                </a:prstGeom>
+              </p:spPr>
+              <p:txBody>
+                <a:bodyPr wrap="none">
+                  <a:spAutoFit/>
+                </a:bodyPr>
+                <a:lstStyle/>
+                <a:p>
+                  <a:pPr/>
+                  <a14:m>
+                    <m:oMathPara xmlns:m="http://schemas.openxmlformats.org/officeDocument/2006/math">
+                      <m:oMathParaPr>
+                        <m:jc m:val="centerGroup"/>
+                      </m:oMathParaPr>
+                      <m:oMath xmlns:m="http://schemas.openxmlformats.org/officeDocument/2006/math">
+                        <m:sSub>
+                          <m:sSubPr>
+                            <m:ctrlPr>
+                              <a:rPr lang="en-US" sz="1200" i="1" smtClean="0">
+                                <a:solidFill>
+                                  <a:schemeClr val="bg1">
+                                    <a:lumMod val="85000"/>
+                                  </a:schemeClr>
+                                </a:solidFill>
+                                <a:latin typeface="Cambria Math" panose="02040503050406030204" pitchFamily="18" charset="0"/>
+                                <a:ea typeface="Lato" panose="020F0502020204030203" pitchFamily="34" charset="0"/>
+                                <a:cs typeface="Lato" panose="020F0502020204030203" pitchFamily="34" charset="0"/>
+                              </a:rPr>
+                            </m:ctrlPr>
+                          </m:sSubPr>
+                          <m:e>
+                            <m:r>
+                              <a:rPr lang="en-US" sz="1200" i="1">
+                                <a:solidFill>
+                                  <a:schemeClr val="bg1">
+                                    <a:lumMod val="85000"/>
+                                  </a:schemeClr>
+                                </a:solidFill>
+                                <a:latin typeface="Cambria Math" panose="02040503050406030204" pitchFamily="18" charset="0"/>
+                                <a:ea typeface="Lato" panose="020F0502020204030203" pitchFamily="34" charset="0"/>
+                                <a:cs typeface="Lato" panose="020F0502020204030203" pitchFamily="34" charset="0"/>
+                              </a:rPr>
+                              <m:t>𝑊</m:t>
+                            </m:r>
+                          </m:e>
+                          <m:sub>
+                            <m:r>
+                              <a:rPr lang="en-US" sz="1200" b="0" i="1" smtClean="0">
+                                <a:solidFill>
+                                  <a:schemeClr val="bg1">
+                                    <a:lumMod val="85000"/>
+                                  </a:schemeClr>
+                                </a:solidFill>
+                                <a:latin typeface="Cambria Math" panose="02040503050406030204" pitchFamily="18" charset="0"/>
+                                <a:ea typeface="Lato" panose="020F0502020204030203" pitchFamily="34" charset="0"/>
+                                <a:cs typeface="Lato" panose="020F0502020204030203" pitchFamily="34" charset="0"/>
+                              </a:rPr>
+                              <m:t>h</m:t>
+                            </m:r>
+                            <m:r>
+                              <a:rPr lang="en-US" sz="1200" b="0" i="1" smtClean="0">
+                                <a:solidFill>
+                                  <a:schemeClr val="bg1">
+                                    <a:lumMod val="85000"/>
+                                  </a:schemeClr>
+                                </a:solidFill>
+                                <a:latin typeface="Cambria Math" panose="02040503050406030204" pitchFamily="18" charset="0"/>
+                                <a:ea typeface="Lato" panose="020F0502020204030203" pitchFamily="34" charset="0"/>
+                                <a:cs typeface="Lato" panose="020F0502020204030203" pitchFamily="34" charset="0"/>
+                              </a:rPr>
+                              <m:t> {</m:t>
+                            </m:r>
+                            <m:r>
+                              <a:rPr lang="en-US" sz="1200" b="0" i="1" smtClean="0">
+                                <a:solidFill>
+                                  <a:schemeClr val="bg1">
+                                    <a:lumMod val="85000"/>
+                                  </a:schemeClr>
+                                </a:solidFill>
+                                <a:latin typeface="Cambria Math" panose="02040503050406030204" pitchFamily="18" charset="0"/>
+                                <a:ea typeface="Lato" panose="020F0502020204030203" pitchFamily="34" charset="0"/>
+                                <a:cs typeface="Lato" panose="020F0502020204030203" pitchFamily="34" charset="0"/>
+                              </a:rPr>
+                              <m:t>𝑓</m:t>
+                            </m:r>
+                            <m:r>
+                              <a:rPr lang="en-US" sz="1200" b="0" i="1" smtClean="0">
+                                <a:solidFill>
+                                  <a:schemeClr val="bg1">
+                                    <a:lumMod val="85000"/>
+                                  </a:schemeClr>
+                                </a:solidFill>
+                                <a:latin typeface="Cambria Math" panose="02040503050406030204" pitchFamily="18" charset="0"/>
+                                <a:ea typeface="Lato" panose="020F0502020204030203" pitchFamily="34" charset="0"/>
+                                <a:cs typeface="Lato" panose="020F0502020204030203" pitchFamily="34" charset="0"/>
+                              </a:rPr>
+                              <m:t>,</m:t>
+                            </m:r>
+                            <m:r>
+                              <a:rPr lang="en-US" sz="1200" b="0" i="1" smtClean="0">
+                                <a:solidFill>
+                                  <a:schemeClr val="bg1">
+                                    <a:lumMod val="85000"/>
+                                  </a:schemeClr>
+                                </a:solidFill>
+                                <a:latin typeface="Cambria Math" panose="02040503050406030204" pitchFamily="18" charset="0"/>
+                                <a:ea typeface="Lato" panose="020F0502020204030203" pitchFamily="34" charset="0"/>
+                                <a:cs typeface="Lato" panose="020F0502020204030203" pitchFamily="34" charset="0"/>
+                              </a:rPr>
+                              <m:t>𝑖</m:t>
+                            </m:r>
+                            <m:r>
+                              <a:rPr lang="en-US" sz="1200" b="0" i="1" smtClean="0">
+                                <a:solidFill>
+                                  <a:schemeClr val="bg1">
+                                    <a:lumMod val="85000"/>
+                                  </a:schemeClr>
+                                </a:solidFill>
+                                <a:latin typeface="Cambria Math" panose="02040503050406030204" pitchFamily="18" charset="0"/>
+                                <a:ea typeface="Lato" panose="020F0502020204030203" pitchFamily="34" charset="0"/>
+                                <a:cs typeface="Lato" panose="020F0502020204030203" pitchFamily="34" charset="0"/>
+                              </a:rPr>
+                              <m:t>,</m:t>
+                            </m:r>
+                            <m:r>
+                              <a:rPr lang="en-US" sz="1200" b="0" i="1" smtClean="0">
+                                <a:solidFill>
+                                  <a:schemeClr val="bg1">
+                                    <a:lumMod val="85000"/>
+                                  </a:schemeClr>
+                                </a:solidFill>
+                                <a:latin typeface="Cambria Math" panose="02040503050406030204" pitchFamily="18" charset="0"/>
+                                <a:ea typeface="Lato" panose="020F0502020204030203" pitchFamily="34" charset="0"/>
+                                <a:cs typeface="Lato" panose="020F0502020204030203" pitchFamily="34" charset="0"/>
+                              </a:rPr>
+                              <m:t>𝑙</m:t>
+                            </m:r>
+                            <m:r>
+                              <a:rPr lang="en-US" sz="1200" b="0" i="1" smtClean="0">
+                                <a:solidFill>
+                                  <a:schemeClr val="bg1">
+                                    <a:lumMod val="85000"/>
+                                  </a:schemeClr>
+                                </a:solidFill>
+                                <a:latin typeface="Cambria Math" panose="02040503050406030204" pitchFamily="18" charset="0"/>
+                                <a:ea typeface="Lato" panose="020F0502020204030203" pitchFamily="34" charset="0"/>
+                                <a:cs typeface="Lato" panose="020F0502020204030203" pitchFamily="34" charset="0"/>
+                              </a:rPr>
+                              <m:t>,</m:t>
+                            </m:r>
+                            <m:r>
+                              <a:rPr lang="en-US" sz="1200" b="0" i="1" smtClean="0">
+                                <a:solidFill>
+                                  <a:schemeClr val="bg1">
+                                    <a:lumMod val="85000"/>
+                                  </a:schemeClr>
+                                </a:solidFill>
+                                <a:latin typeface="Cambria Math" panose="02040503050406030204" pitchFamily="18" charset="0"/>
+                                <a:ea typeface="Lato" panose="020F0502020204030203" pitchFamily="34" charset="0"/>
+                                <a:cs typeface="Lato" panose="020F0502020204030203" pitchFamily="34" charset="0"/>
+                              </a:rPr>
+                              <m:t>𝑜</m:t>
+                            </m:r>
+                            <m:r>
+                              <a:rPr lang="en-US" sz="1200" b="0" i="1" smtClean="0">
+                                <a:solidFill>
+                                  <a:schemeClr val="bg1">
+                                    <a:lumMod val="85000"/>
+                                  </a:schemeClr>
+                                </a:solidFill>
+                                <a:latin typeface="Cambria Math" panose="02040503050406030204" pitchFamily="18" charset="0"/>
+                                <a:ea typeface="Lato" panose="020F0502020204030203" pitchFamily="34" charset="0"/>
+                                <a:cs typeface="Lato" panose="020F0502020204030203" pitchFamily="34" charset="0"/>
+                              </a:rPr>
+                              <m:t>}</m:t>
+                            </m:r>
+                          </m:sub>
+                        </m:sSub>
+                      </m:oMath>
+                    </m:oMathPara>
+                  </a14:m>
+                  <a:endParaRPr lang="en-US" sz="1200" dirty="0">
+                    <a:solidFill>
+                      <a:schemeClr val="bg1">
+                        <a:lumMod val="85000"/>
+                      </a:schemeClr>
+                    </a:solidFill>
+                  </a:endParaRPr>
+                </a:p>
+              </p:txBody>
+            </p:sp>
+          </mc:Choice>
+          <mc:Fallback xmlns="">
+            <p:sp>
+              <p:nvSpPr>
+                <p:cNvPr id="111" name="Rectangle 110">
+                  <a:extLst>
+                    <a:ext uri="{FF2B5EF4-FFF2-40B4-BE49-F238E27FC236}">
+                      <a16:creationId xmlns:a16="http://schemas.microsoft.com/office/drawing/2014/main" id="{0F68B877-3413-4A8F-BE36-CF72CEFBDF33}"/>
+                    </a:ext>
+                  </a:extLst>
+                </p:cNvPr>
+                <p:cNvSpPr>
+                  <a:spLocks noRot="1" noChangeAspect="1" noMove="1" noResize="1" noEditPoints="1" noAdjustHandles="1" noChangeArrowheads="1" noChangeShapeType="1" noTextEdit="1"/>
+                </p:cNvSpPr>
+                <p:nvPr/>
+              </p:nvSpPr>
+              <p:spPr>
+                <a:xfrm>
+                  <a:off x="9476633" y="5547671"/>
+                  <a:ext cx="829394" cy="295081"/>
+                </a:xfrm>
+                <a:prstGeom prst="rect">
+                  <a:avLst/>
+                </a:prstGeom>
+                <a:blipFill>
+                  <a:blip r:embed="rId24"/>
+                  <a:stretch>
+                    <a:fillRect b="-2041"/>
+                  </a:stretch>
+                </a:blipFill>
+              </p:spPr>
+              <p:txBody>
+                <a:bodyPr/>
+                <a:lstStyle/>
+                <a:p>
+                  <a:r>
+                    <a:rPr lang="en-US">
+                      <a:noFill/>
+                    </a:rPr>
+                    <a:t> </a:t>
+                  </a:r>
+                </a:p>
+              </p:txBody>
+            </p:sp>
+          </mc:Fallback>
+        </mc:AlternateContent>
+        <p:sp>
+          <p:nvSpPr>
+            <p:cNvPr id="121" name="Rectangle 120">
+              <a:extLst>
+                <a:ext uri="{FF2B5EF4-FFF2-40B4-BE49-F238E27FC236}">
+                  <a16:creationId xmlns:a16="http://schemas.microsoft.com/office/drawing/2014/main" id="{296B9E36-2ADF-4465-BA58-8EC2F6464EA8}"/>
+                </a:ext>
+              </a:extLst>
+            </p:cNvPr>
+            <p:cNvSpPr/>
+            <p:nvPr/>
+          </p:nvSpPr>
+          <p:spPr>
+            <a:xfrm>
+              <a:off x="10112042" y="5572828"/>
+              <a:ext cx="822085" cy="276999"/>
+            </a:xfrm>
+            <a:prstGeom prst="rect">
+              <a:avLst/>
+            </a:prstGeom>
+          </p:spPr>
+          <p:txBody>
+            <a:bodyPr wrap="none">
+              <a:spAutoFit/>
+            </a:bodyPr>
+            <a:lstStyle/>
+            <a:p>
+              <a:r>
+                <a:rPr lang="en-US" sz="1200" dirty="0">
+                  <a:solidFill>
+                    <a:schemeClr val="bg1">
+                      <a:lumMod val="85000"/>
+                    </a:schemeClr>
+                  </a:solidFill>
+                </a:rPr>
+                <a:t> </a:t>
+              </a:r>
+              <a:r>
+                <a:rPr lang="en-US" sz="1200" i="1" dirty="0">
+                  <a:solidFill>
+                    <a:schemeClr val="bg1">
+                      <a:lumMod val="85000"/>
+                    </a:schemeClr>
+                  </a:solidFill>
+                </a:rPr>
+                <a:t>Size: (</a:t>
+              </a:r>
+              <a:r>
+                <a:rPr lang="en-US" sz="1200" i="1" dirty="0" err="1">
+                  <a:solidFill>
+                    <a:schemeClr val="bg1">
+                      <a:lumMod val="85000"/>
+                    </a:schemeClr>
+                  </a:solidFill>
+                </a:rPr>
+                <a:t>h,h</a:t>
+              </a:r>
+              <a:r>
+                <a:rPr lang="en-US" sz="1200" i="1" dirty="0">
+                  <a:solidFill>
+                    <a:schemeClr val="bg1">
+                      <a:lumMod val="85000"/>
+                    </a:schemeClr>
+                  </a:solidFill>
+                </a:rPr>
+                <a:t>)</a:t>
+              </a:r>
+              <a:endParaRPr lang="en-US" sz="1200" dirty="0">
+                <a:solidFill>
+                  <a:schemeClr val="bg1">
+                    <a:lumMod val="85000"/>
+                  </a:schemeClr>
+                </a:solidFill>
+              </a:endParaRPr>
+            </a:p>
+          </p:txBody>
+        </p:sp>
+        <p:sp>
+          <p:nvSpPr>
+            <p:cNvPr id="126" name="Rectangle 125">
+              <a:extLst>
+                <a:ext uri="{FF2B5EF4-FFF2-40B4-BE49-F238E27FC236}">
+                  <a16:creationId xmlns:a16="http://schemas.microsoft.com/office/drawing/2014/main" id="{AC308AB3-8183-43BA-9266-24BEA90BCCFF}"/>
+                </a:ext>
+              </a:extLst>
+            </p:cNvPr>
+            <p:cNvSpPr/>
+            <p:nvPr/>
+          </p:nvSpPr>
+          <p:spPr>
+            <a:xfrm>
+              <a:off x="10117652" y="5841212"/>
+              <a:ext cx="810863" cy="276999"/>
+            </a:xfrm>
+            <a:prstGeom prst="rect">
+              <a:avLst/>
+            </a:prstGeom>
+          </p:spPr>
+          <p:txBody>
+            <a:bodyPr wrap="none">
+              <a:spAutoFit/>
+            </a:bodyPr>
+            <a:lstStyle/>
+            <a:p>
+              <a:r>
+                <a:rPr lang="en-US" sz="1200" dirty="0">
+                  <a:solidFill>
+                    <a:schemeClr val="bg1">
+                      <a:lumMod val="85000"/>
+                    </a:schemeClr>
+                  </a:solidFill>
+                </a:rPr>
+                <a:t> </a:t>
+              </a:r>
+              <a:r>
+                <a:rPr lang="en-US" sz="1200" i="1" dirty="0">
+                  <a:solidFill>
+                    <a:schemeClr val="bg1">
+                      <a:lumMod val="85000"/>
+                    </a:schemeClr>
+                  </a:solidFill>
+                </a:rPr>
+                <a:t>Size: (</a:t>
+              </a:r>
+              <a:r>
+                <a:rPr lang="en-US" sz="1200" i="1" dirty="0" err="1">
+                  <a:solidFill>
+                    <a:schemeClr val="bg1">
+                      <a:lumMod val="85000"/>
+                    </a:schemeClr>
+                  </a:solidFill>
+                </a:rPr>
+                <a:t>h,x</a:t>
+              </a:r>
+              <a:r>
+                <a:rPr lang="en-US" sz="1200" i="1" dirty="0">
+                  <a:solidFill>
+                    <a:schemeClr val="bg1">
+                      <a:lumMod val="85000"/>
+                    </a:schemeClr>
+                  </a:solidFill>
+                </a:rPr>
+                <a:t>)</a:t>
+              </a:r>
+              <a:endParaRPr lang="en-US" sz="1200" dirty="0">
+                <a:solidFill>
+                  <a:schemeClr val="bg1">
+                    <a:lumMod val="85000"/>
+                  </a:schemeClr>
+                </a:solidFill>
+              </a:endParaRPr>
+            </a:p>
+          </p:txBody>
+        </p:sp>
+        <mc:AlternateContent xmlns:mc="http://schemas.openxmlformats.org/markup-compatibility/2006" xmlns:a14="http://schemas.microsoft.com/office/drawing/2010/main">
+          <mc:Choice Requires="a14">
+            <p:sp>
+              <p:nvSpPr>
+                <p:cNvPr id="127" name="Rectangle 126">
+                  <a:extLst>
+                    <a:ext uri="{FF2B5EF4-FFF2-40B4-BE49-F238E27FC236}">
+                      <a16:creationId xmlns:a16="http://schemas.microsoft.com/office/drawing/2014/main" id="{EDC140D2-1418-419E-A29D-3A97F361AC2A}"/>
+                    </a:ext>
+                  </a:extLst>
+                </p:cNvPr>
+                <p:cNvSpPr/>
+                <p:nvPr/>
+              </p:nvSpPr>
+              <p:spPr>
+                <a:xfrm>
+                  <a:off x="9487253" y="5816055"/>
+                  <a:ext cx="824778" cy="295081"/>
+                </a:xfrm>
+                <a:prstGeom prst="rect">
+                  <a:avLst/>
+                </a:prstGeom>
+              </p:spPr>
+              <p:txBody>
+                <a:bodyPr wrap="none">
+                  <a:spAutoFit/>
+                </a:bodyPr>
+                <a:lstStyle/>
+                <a:p>
+                  <a:pPr/>
+                  <a14:m>
+                    <m:oMathPara xmlns:m="http://schemas.openxmlformats.org/officeDocument/2006/math">
+                      <m:oMathParaPr>
+                        <m:jc m:val="centerGroup"/>
+                      </m:oMathParaPr>
+                      <m:oMath xmlns:m="http://schemas.openxmlformats.org/officeDocument/2006/math">
+                        <m:sSub>
+                          <m:sSubPr>
+                            <m:ctrlPr>
+                              <a:rPr lang="en-US" sz="1200" i="1" smtClean="0">
+                                <a:solidFill>
+                                  <a:schemeClr val="bg1">
+                                    <a:lumMod val="85000"/>
+                                  </a:schemeClr>
+                                </a:solidFill>
+                                <a:latin typeface="Cambria Math" panose="02040503050406030204" pitchFamily="18" charset="0"/>
+                                <a:ea typeface="Lato" panose="020F0502020204030203" pitchFamily="34" charset="0"/>
+                                <a:cs typeface="Lato" panose="020F0502020204030203" pitchFamily="34" charset="0"/>
+                              </a:rPr>
+                            </m:ctrlPr>
+                          </m:sSubPr>
+                          <m:e>
+                            <m:r>
+                              <a:rPr lang="en-US" sz="1200" i="1">
+                                <a:solidFill>
+                                  <a:schemeClr val="bg1">
+                                    <a:lumMod val="85000"/>
+                                  </a:schemeClr>
+                                </a:solidFill>
+                                <a:latin typeface="Cambria Math" panose="02040503050406030204" pitchFamily="18" charset="0"/>
+                                <a:ea typeface="Lato" panose="020F0502020204030203" pitchFamily="34" charset="0"/>
+                                <a:cs typeface="Lato" panose="020F0502020204030203" pitchFamily="34" charset="0"/>
+                              </a:rPr>
+                              <m:t>𝑊</m:t>
+                            </m:r>
+                          </m:e>
+                          <m:sub>
+                            <m:r>
+                              <a:rPr lang="en-US" sz="1200" b="0" i="1" smtClean="0">
+                                <a:solidFill>
+                                  <a:schemeClr val="bg1">
+                                    <a:lumMod val="85000"/>
+                                  </a:schemeClr>
+                                </a:solidFill>
+                                <a:latin typeface="Cambria Math" panose="02040503050406030204" pitchFamily="18" charset="0"/>
+                                <a:ea typeface="Lato" panose="020F0502020204030203" pitchFamily="34" charset="0"/>
+                                <a:cs typeface="Lato" panose="020F0502020204030203" pitchFamily="34" charset="0"/>
+                              </a:rPr>
+                              <m:t>𝑥</m:t>
+                            </m:r>
+                            <m:r>
+                              <a:rPr lang="en-US" sz="1200" b="0" i="1" smtClean="0">
+                                <a:solidFill>
+                                  <a:schemeClr val="bg1">
+                                    <a:lumMod val="85000"/>
+                                  </a:schemeClr>
+                                </a:solidFill>
+                                <a:latin typeface="Cambria Math" panose="02040503050406030204" pitchFamily="18" charset="0"/>
+                                <a:ea typeface="Lato" panose="020F0502020204030203" pitchFamily="34" charset="0"/>
+                                <a:cs typeface="Lato" panose="020F0502020204030203" pitchFamily="34" charset="0"/>
+                              </a:rPr>
+                              <m:t> {</m:t>
+                            </m:r>
+                            <m:r>
+                              <a:rPr lang="en-US" sz="1200" b="0" i="1" smtClean="0">
+                                <a:solidFill>
+                                  <a:schemeClr val="bg1">
+                                    <a:lumMod val="85000"/>
+                                  </a:schemeClr>
+                                </a:solidFill>
+                                <a:latin typeface="Cambria Math" panose="02040503050406030204" pitchFamily="18" charset="0"/>
+                                <a:ea typeface="Lato" panose="020F0502020204030203" pitchFamily="34" charset="0"/>
+                                <a:cs typeface="Lato" panose="020F0502020204030203" pitchFamily="34" charset="0"/>
+                              </a:rPr>
+                              <m:t>𝑓</m:t>
+                            </m:r>
+                            <m:r>
+                              <a:rPr lang="en-US" sz="1200" b="0" i="1" smtClean="0">
+                                <a:solidFill>
+                                  <a:schemeClr val="bg1">
+                                    <a:lumMod val="85000"/>
+                                  </a:schemeClr>
+                                </a:solidFill>
+                                <a:latin typeface="Cambria Math" panose="02040503050406030204" pitchFamily="18" charset="0"/>
+                                <a:ea typeface="Lato" panose="020F0502020204030203" pitchFamily="34" charset="0"/>
+                                <a:cs typeface="Lato" panose="020F0502020204030203" pitchFamily="34" charset="0"/>
+                              </a:rPr>
+                              <m:t>,</m:t>
+                            </m:r>
+                            <m:r>
+                              <a:rPr lang="en-US" sz="1200" b="0" i="1" smtClean="0">
+                                <a:solidFill>
+                                  <a:schemeClr val="bg1">
+                                    <a:lumMod val="85000"/>
+                                  </a:schemeClr>
+                                </a:solidFill>
+                                <a:latin typeface="Cambria Math" panose="02040503050406030204" pitchFamily="18" charset="0"/>
+                                <a:ea typeface="Lato" panose="020F0502020204030203" pitchFamily="34" charset="0"/>
+                                <a:cs typeface="Lato" panose="020F0502020204030203" pitchFamily="34" charset="0"/>
+                              </a:rPr>
+                              <m:t>𝑖</m:t>
+                            </m:r>
+                            <m:r>
+                              <a:rPr lang="en-US" sz="1200" b="0" i="1" smtClean="0">
+                                <a:solidFill>
+                                  <a:schemeClr val="bg1">
+                                    <a:lumMod val="85000"/>
+                                  </a:schemeClr>
+                                </a:solidFill>
+                                <a:latin typeface="Cambria Math" panose="02040503050406030204" pitchFamily="18" charset="0"/>
+                                <a:ea typeface="Lato" panose="020F0502020204030203" pitchFamily="34" charset="0"/>
+                                <a:cs typeface="Lato" panose="020F0502020204030203" pitchFamily="34" charset="0"/>
+                              </a:rPr>
+                              <m:t>,</m:t>
+                            </m:r>
+                            <m:r>
+                              <a:rPr lang="en-US" sz="1200" b="0" i="1" smtClean="0">
+                                <a:solidFill>
+                                  <a:schemeClr val="bg1">
+                                    <a:lumMod val="85000"/>
+                                  </a:schemeClr>
+                                </a:solidFill>
+                                <a:latin typeface="Cambria Math" panose="02040503050406030204" pitchFamily="18" charset="0"/>
+                                <a:ea typeface="Lato" panose="020F0502020204030203" pitchFamily="34" charset="0"/>
+                                <a:cs typeface="Lato" panose="020F0502020204030203" pitchFamily="34" charset="0"/>
+                              </a:rPr>
+                              <m:t>𝑙</m:t>
+                            </m:r>
+                            <m:r>
+                              <a:rPr lang="en-US" sz="1200" b="0" i="1" smtClean="0">
+                                <a:solidFill>
+                                  <a:schemeClr val="bg1">
+                                    <a:lumMod val="85000"/>
+                                  </a:schemeClr>
+                                </a:solidFill>
+                                <a:latin typeface="Cambria Math" panose="02040503050406030204" pitchFamily="18" charset="0"/>
+                                <a:ea typeface="Lato" panose="020F0502020204030203" pitchFamily="34" charset="0"/>
+                                <a:cs typeface="Lato" panose="020F0502020204030203" pitchFamily="34" charset="0"/>
+                              </a:rPr>
+                              <m:t>,</m:t>
+                            </m:r>
+                            <m:r>
+                              <a:rPr lang="en-US" sz="1200" b="0" i="1" smtClean="0">
+                                <a:solidFill>
+                                  <a:schemeClr val="bg1">
+                                    <a:lumMod val="85000"/>
+                                  </a:schemeClr>
+                                </a:solidFill>
+                                <a:latin typeface="Cambria Math" panose="02040503050406030204" pitchFamily="18" charset="0"/>
+                                <a:ea typeface="Lato" panose="020F0502020204030203" pitchFamily="34" charset="0"/>
+                                <a:cs typeface="Lato" panose="020F0502020204030203" pitchFamily="34" charset="0"/>
+                              </a:rPr>
+                              <m:t>𝑜</m:t>
+                            </m:r>
+                            <m:r>
+                              <a:rPr lang="en-US" sz="1200" b="0" i="1" smtClean="0">
+                                <a:solidFill>
+                                  <a:schemeClr val="bg1">
+                                    <a:lumMod val="85000"/>
+                                  </a:schemeClr>
+                                </a:solidFill>
+                                <a:latin typeface="Cambria Math" panose="02040503050406030204" pitchFamily="18" charset="0"/>
+                                <a:ea typeface="Lato" panose="020F0502020204030203" pitchFamily="34" charset="0"/>
+                                <a:cs typeface="Lato" panose="020F0502020204030203" pitchFamily="34" charset="0"/>
+                              </a:rPr>
+                              <m:t>}</m:t>
+                            </m:r>
+                          </m:sub>
+                        </m:sSub>
+                      </m:oMath>
+                    </m:oMathPara>
+                  </a14:m>
+                  <a:endParaRPr lang="en-US" sz="1200" dirty="0">
+                    <a:solidFill>
+                      <a:schemeClr val="bg1">
+                        <a:lumMod val="85000"/>
+                      </a:schemeClr>
+                    </a:solidFill>
+                  </a:endParaRPr>
+                </a:p>
+              </p:txBody>
+            </p:sp>
+          </mc:Choice>
+          <mc:Fallback xmlns="">
+            <p:sp>
+              <p:nvSpPr>
+                <p:cNvPr id="127" name="Rectangle 126">
+                  <a:extLst>
+                    <a:ext uri="{FF2B5EF4-FFF2-40B4-BE49-F238E27FC236}">
+                      <a16:creationId xmlns:a16="http://schemas.microsoft.com/office/drawing/2014/main" id="{EDC140D2-1418-419E-A29D-3A97F361AC2A}"/>
+                    </a:ext>
+                  </a:extLst>
+                </p:cNvPr>
+                <p:cNvSpPr>
+                  <a:spLocks noRot="1" noChangeAspect="1" noMove="1" noResize="1" noEditPoints="1" noAdjustHandles="1" noChangeArrowheads="1" noChangeShapeType="1" noTextEdit="1"/>
+                </p:cNvSpPr>
+                <p:nvPr/>
+              </p:nvSpPr>
+              <p:spPr>
+                <a:xfrm>
+                  <a:off x="9487253" y="5816055"/>
+                  <a:ext cx="824778" cy="295081"/>
+                </a:xfrm>
+                <a:prstGeom prst="rect">
+                  <a:avLst/>
+                </a:prstGeom>
+                <a:blipFill>
+                  <a:blip r:embed="rId25"/>
+                  <a:stretch>
+                    <a:fillRect b="-2041"/>
+                  </a:stretch>
+                </a:blipFill>
+              </p:spPr>
+              <p:txBody>
+                <a:bodyPr/>
+                <a:lstStyle/>
+                <a:p>
+                  <a:r>
+                    <a:rPr lang="en-US">
+                      <a:noFill/>
+                    </a:rPr>
+                    <a:t> </a:t>
+                  </a:r>
+                </a:p>
+              </p:txBody>
+            </p:sp>
+          </mc:Fallback>
+        </mc:AlternateContent>
+      </p:grpSp>
+      <mc:AlternateContent xmlns:mc="http://schemas.openxmlformats.org/markup-compatibility/2006" xmlns:a14="http://schemas.microsoft.com/office/drawing/2010/main">
+        <mc:Choice Requires="a14">
+          <p:sp>
+            <p:nvSpPr>
+              <p:cNvPr id="128" name="Rectangle 127">
+                <a:extLst>
+                  <a:ext uri="{FF2B5EF4-FFF2-40B4-BE49-F238E27FC236}">
+                    <a16:creationId xmlns:a16="http://schemas.microsoft.com/office/drawing/2014/main" id="{5C2D203D-6FCD-4A9C-A1B4-69F9A6045597}"/>
+                  </a:ext>
+                </a:extLst>
+              </p:cNvPr>
+              <p:cNvSpPr/>
+              <p:nvPr/>
+            </p:nvSpPr>
+            <p:spPr>
+              <a:xfrm>
+                <a:off x="7537637" y="4981023"/>
+                <a:ext cx="270101" cy="248328"/>
+              </a:xfrm>
+              <a:prstGeom prst="rect">
+                <a:avLst/>
+              </a:prstGeom>
+              <a:solidFill>
+                <a:schemeClr val="tx1">
+                  <a:lumMod val="65000"/>
+                  <a:lumOff val="35000"/>
+                </a:schemeClr>
+              </a:solidFill>
+              <a:ln w="9525">
+                <a:solidFill>
+                  <a:schemeClr val="bg1"/>
+                </a:solidFill>
+              </a:ln>
+            </p:spPr>
+            <p:style>
+              <a:lnRef idx="2">
+                <a:schemeClr val="accent1">
+                  <a:shade val="50000"/>
+                </a:schemeClr>
+              </a:lnRef>
+              <a:fillRef idx="1">
+                <a:schemeClr val="accent1"/>
+              </a:fillRef>
+              <a:effectRef idx="0">
+                <a:schemeClr val="accent1"/>
+              </a:effectRef>
+              <a:fontRef idx="minor">
+                <a:schemeClr val="lt1"/>
+              </a:fontRef>
+            </p:style>
+            <p:txBody>
+              <a:bodyPr rot="0" spcFirstLastPara="0" vertOverflow="overflow" horzOverflow="overflow" vert="horz" wrap="square" lIns="0" tIns="45720" rIns="0" bIns="45720" numCol="1" spcCol="0" rtlCol="0" fromWordArt="0" anchor="ctr" anchorCtr="0" forceAA="0" compatLnSpc="1">
+                <a:prstTxWarp prst="textNoShape">
+                  <a:avLst/>
+                </a:prstTxWarp>
+                <a:noAutofit/>
+              </a:bodyPr>
+              <a:lstStyle/>
+              <a:p>
+                <a:pPr algn="just"/>
+                <a14:m>
+                  <m:oMathPara xmlns:m="http://schemas.openxmlformats.org/officeDocument/2006/math">
+                    <m:oMathParaPr>
+                      <m:jc m:val="center"/>
+                    </m:oMathParaPr>
+                    <m:oMath xmlns:m="http://schemas.openxmlformats.org/officeDocument/2006/math">
+                      <m:r>
+                        <a:rPr lang="en-US" i="1" smtClean="0">
+                          <a:solidFill>
+                            <a:schemeClr val="bg1"/>
+                          </a:solidFill>
+                          <a:latin typeface="Cambria Math" panose="02040503050406030204" pitchFamily="18" charset="0"/>
+                          <a:ea typeface="Cambria Math" panose="02040503050406030204" pitchFamily="18" charset="0"/>
+                        </a:rPr>
+                        <m:t>×</m:t>
+                      </m:r>
+                    </m:oMath>
+                  </m:oMathPara>
+                </a14:m>
+                <a:endParaRPr lang="en-US" dirty="0">
+                  <a:solidFill>
+                    <a:schemeClr val="bg1"/>
+                  </a:solidFill>
+                </a:endParaRPr>
+              </a:p>
+            </p:txBody>
+          </p:sp>
+        </mc:Choice>
+        <mc:Fallback xmlns="">
+          <p:sp>
+            <p:nvSpPr>
+              <p:cNvPr id="128" name="Rectangle 127">
+                <a:extLst>
+                  <a:ext uri="{FF2B5EF4-FFF2-40B4-BE49-F238E27FC236}">
+                    <a16:creationId xmlns:a16="http://schemas.microsoft.com/office/drawing/2014/main" id="{5C2D203D-6FCD-4A9C-A1B4-69F9A6045597}"/>
+                  </a:ext>
+                </a:extLst>
+              </p:cNvPr>
+              <p:cNvSpPr>
+                <a:spLocks noRot="1" noChangeAspect="1" noMove="1" noResize="1" noEditPoints="1" noAdjustHandles="1" noChangeArrowheads="1" noChangeShapeType="1" noTextEdit="1"/>
+              </p:cNvSpPr>
+              <p:nvPr/>
+            </p:nvSpPr>
+            <p:spPr>
+              <a:xfrm>
+                <a:off x="7537637" y="4981023"/>
+                <a:ext cx="270101" cy="248328"/>
+              </a:xfrm>
+              <a:prstGeom prst="rect">
+                <a:avLst/>
+              </a:prstGeom>
+              <a:blipFill>
+                <a:blip r:embed="rId26"/>
+                <a:stretch>
+                  <a:fillRect l="-2128" r="-2128" b="-4651"/>
+                </a:stretch>
+              </a:blipFill>
+              <a:ln w="9525">
+                <a:solidFill>
+                  <a:schemeClr val="bg1"/>
+                </a:solidFill>
+              </a:ln>
+            </p:spPr>
+            <p:txBody>
+              <a:bodyPr/>
+              <a:lstStyle/>
+              <a:p>
+                <a:r>
+                  <a:rPr lang="en-US">
+                    <a:noFill/>
+                  </a:rPr>
+                  <a:t> </a:t>
+                </a:r>
+              </a:p>
+            </p:txBody>
+          </p:sp>
+        </mc:Fallback>
+      </mc:AlternateContent>
+      <p:sp>
+        <p:nvSpPr>
+          <p:cNvPr id="129" name="Rectangle 128">
+            <a:extLst>
+              <a:ext uri="{FF2B5EF4-FFF2-40B4-BE49-F238E27FC236}">
+                <a16:creationId xmlns:a16="http://schemas.microsoft.com/office/drawing/2014/main" id="{DCADAC0D-C4C1-47AA-AC89-67B74FC00F4B}"/>
+              </a:ext>
+            </a:extLst>
+          </p:cNvPr>
+          <p:cNvSpPr/>
+          <p:nvPr/>
+        </p:nvSpPr>
+        <p:spPr>
+          <a:xfrm>
+            <a:off x="7821453" y="5488793"/>
+            <a:ext cx="810863" cy="276999"/>
+          </a:xfrm>
+          <a:prstGeom prst="rect">
+            <a:avLst/>
+          </a:prstGeom>
+        </p:spPr>
+        <p:txBody>
+          <a:bodyPr wrap="none">
+            <a:spAutoFit/>
+          </a:bodyPr>
+          <a:lstStyle/>
+          <a:p>
+            <a:r>
+              <a:rPr lang="en-US" sz="1200" dirty="0">
+                <a:solidFill>
+                  <a:schemeClr val="bg1">
+                    <a:lumMod val="85000"/>
+                  </a:schemeClr>
+                </a:solidFill>
+              </a:rPr>
+              <a:t> </a:t>
+            </a:r>
+            <a:r>
+              <a:rPr lang="en-US" sz="1200" i="1" dirty="0">
+                <a:solidFill>
+                  <a:schemeClr val="bg1">
+                    <a:lumMod val="85000"/>
+                  </a:schemeClr>
+                </a:solidFill>
+              </a:rPr>
+              <a:t>Size: (</a:t>
+            </a:r>
+            <a:r>
+              <a:rPr lang="en-US" sz="1200" i="1" dirty="0" err="1">
+                <a:solidFill>
+                  <a:schemeClr val="bg1">
+                    <a:lumMod val="85000"/>
+                  </a:schemeClr>
+                </a:solidFill>
+              </a:rPr>
+              <a:t>h,x</a:t>
+            </a:r>
+            <a:r>
+              <a:rPr lang="en-US" sz="1200" i="1" dirty="0">
+                <a:solidFill>
+                  <a:schemeClr val="bg1">
+                    <a:lumMod val="85000"/>
+                  </a:schemeClr>
+                </a:solidFill>
+              </a:rPr>
+              <a:t>)</a:t>
+            </a:r>
+            <a:endParaRPr lang="en-US" sz="1200" dirty="0">
+              <a:solidFill>
+                <a:schemeClr val="bg1">
+                  <a:lumMod val="85000"/>
+                </a:schemeClr>
+              </a:solidFill>
+            </a:endParaRPr>
+          </a:p>
+        </p:txBody>
+      </p:sp>
+      <p:cxnSp>
+        <p:nvCxnSpPr>
+          <p:cNvPr id="130" name="Straight Connector 22">
+            <a:extLst>
+              <a:ext uri="{FF2B5EF4-FFF2-40B4-BE49-F238E27FC236}">
+                <a16:creationId xmlns:a16="http://schemas.microsoft.com/office/drawing/2014/main" id="{C37A3E28-70F1-451D-8EE5-CB7BDAA5BBC2}"/>
+              </a:ext>
+            </a:extLst>
+          </p:cNvPr>
+          <p:cNvCxnSpPr>
+            <a:cxnSpLocks/>
+          </p:cNvCxnSpPr>
+          <p:nvPr/>
+        </p:nvCxnSpPr>
+        <p:spPr>
+          <a:xfrm>
+            <a:off x="7555088" y="5636621"/>
+            <a:ext cx="240301" cy="1"/>
+          </a:xfrm>
+          <a:prstGeom prst="straightConnector1">
+            <a:avLst/>
+          </a:prstGeom>
+          <a:ln w="12700">
+            <a:solidFill>
+              <a:schemeClr val="bg1"/>
+            </a:solidFill>
+            <a:prstDash val="sysDash"/>
+            <a:headEnd type="none"/>
+            <a:tailEnd type="none" w="sm" len="sm"/>
+          </a:ln>
+        </p:spPr>
+        <p:style>
+          <a:lnRef idx="1">
+            <a:schemeClr val="accent1"/>
+          </a:lnRef>
+          <a:fillRef idx="0">
+            <a:schemeClr val="accent1"/>
+          </a:fillRef>
+          <a:effectRef idx="0">
+            <a:schemeClr val="accent1"/>
+          </a:effectRef>
+          <a:fontRef idx="minor">
+            <a:schemeClr val="tx1"/>
+          </a:fontRef>
+        </p:style>
+      </p:cxnSp>
     </p:spTree>
     <p:extLst>
       <p:ext uri="{BB962C8B-B14F-4D97-AF65-F5344CB8AC3E}">
@@ -19254,6 +20705,269 @@
                       </p:childTnLst>
                     </p:cTn>
                   </p:par>
+                  <p:par>
+                    <p:cTn id="408" fill="hold">
+                      <p:stCondLst>
+                        <p:cond delay="indefinite"/>
+                      </p:stCondLst>
+                      <p:childTnLst>
+                        <p:par>
+                          <p:cTn id="409" fill="hold">
+                            <p:stCondLst>
+                              <p:cond delay="0"/>
+                            </p:stCondLst>
+                            <p:childTnLst>
+                              <p:par>
+                                <p:cTn id="410" presetID="10" presetClass="entr" presetSubtype="0" fill="hold" grpId="0" nodeType="clickEffect">
+                                  <p:stCondLst>
+                                    <p:cond delay="0"/>
+                                  </p:stCondLst>
+                                  <p:childTnLst>
+                                    <p:set>
+                                      <p:cBhvr>
+                                        <p:cTn id="411" dur="1" fill="hold">
+                                          <p:stCondLst>
+                                            <p:cond delay="0"/>
+                                          </p:stCondLst>
+                                        </p:cTn>
+                                        <p:tgtEl>
+                                          <p:spTgt spid="128"/>
+                                        </p:tgtEl>
+                                        <p:attrNameLst>
+                                          <p:attrName>style.visibility</p:attrName>
+                                        </p:attrNameLst>
+                                      </p:cBhvr>
+                                      <p:to>
+                                        <p:strVal val="visible"/>
+                                      </p:to>
+                                    </p:set>
+                                    <p:animEffect transition="in" filter="fade">
+                                      <p:cBhvr>
+                                        <p:cTn id="412" dur="500"/>
+                                        <p:tgtEl>
+                                          <p:spTgt spid="128"/>
+                                        </p:tgtEl>
+                                      </p:cBhvr>
+                                    </p:animEffect>
+                                  </p:childTnLst>
+                                </p:cTn>
+                              </p:par>
+                              <p:par>
+                                <p:cTn id="413" presetID="10" presetClass="entr" presetSubtype="0" fill="hold" grpId="0" nodeType="withEffect">
+                                  <p:stCondLst>
+                                    <p:cond delay="0"/>
+                                  </p:stCondLst>
+                                  <p:childTnLst>
+                                    <p:set>
+                                      <p:cBhvr>
+                                        <p:cTn id="414" dur="1" fill="hold">
+                                          <p:stCondLst>
+                                            <p:cond delay="0"/>
+                                          </p:stCondLst>
+                                        </p:cTn>
+                                        <p:tgtEl>
+                                          <p:spTgt spid="105"/>
+                                        </p:tgtEl>
+                                        <p:attrNameLst>
+                                          <p:attrName>style.visibility</p:attrName>
+                                        </p:attrNameLst>
+                                      </p:cBhvr>
+                                      <p:to>
+                                        <p:strVal val="visible"/>
+                                      </p:to>
+                                    </p:set>
+                                    <p:animEffect transition="in" filter="fade">
+                                      <p:cBhvr>
+                                        <p:cTn id="415" dur="500"/>
+                                        <p:tgtEl>
+                                          <p:spTgt spid="105"/>
+                                        </p:tgtEl>
+                                      </p:cBhvr>
+                                    </p:animEffect>
+                                  </p:childTnLst>
+                                </p:cTn>
+                              </p:par>
+                              <p:par>
+                                <p:cTn id="416" presetID="10" presetClass="entr" presetSubtype="0" fill="hold" nodeType="withEffect">
+                                  <p:stCondLst>
+                                    <p:cond delay="0"/>
+                                  </p:stCondLst>
+                                  <p:childTnLst>
+                                    <p:set>
+                                      <p:cBhvr>
+                                        <p:cTn id="417" dur="1" fill="hold">
+                                          <p:stCondLst>
+                                            <p:cond delay="0"/>
+                                          </p:stCondLst>
+                                        </p:cTn>
+                                        <p:tgtEl>
+                                          <p:spTgt spid="122"/>
+                                        </p:tgtEl>
+                                        <p:attrNameLst>
+                                          <p:attrName>style.visibility</p:attrName>
+                                        </p:attrNameLst>
+                                      </p:cBhvr>
+                                      <p:to>
+                                        <p:strVal val="visible"/>
+                                      </p:to>
+                                    </p:set>
+                                    <p:animEffect transition="in" filter="fade">
+                                      <p:cBhvr>
+                                        <p:cTn id="418" dur="500"/>
+                                        <p:tgtEl>
+                                          <p:spTgt spid="122"/>
+                                        </p:tgtEl>
+                                      </p:cBhvr>
+                                    </p:animEffect>
+                                  </p:childTnLst>
+                                </p:cTn>
+                              </p:par>
+                              <p:par>
+                                <p:cTn id="419" presetID="10" presetClass="entr" presetSubtype="0" fill="hold" grpId="0" nodeType="withEffect">
+                                  <p:stCondLst>
+                                    <p:cond delay="0"/>
+                                  </p:stCondLst>
+                                  <p:childTnLst>
+                                    <p:set>
+                                      <p:cBhvr>
+                                        <p:cTn id="420" dur="1" fill="hold">
+                                          <p:stCondLst>
+                                            <p:cond delay="0"/>
+                                          </p:stCondLst>
+                                        </p:cTn>
+                                        <p:tgtEl>
+                                          <p:spTgt spid="123"/>
+                                        </p:tgtEl>
+                                        <p:attrNameLst>
+                                          <p:attrName>style.visibility</p:attrName>
+                                        </p:attrNameLst>
+                                      </p:cBhvr>
+                                      <p:to>
+                                        <p:strVal val="visible"/>
+                                      </p:to>
+                                    </p:set>
+                                    <p:animEffect transition="in" filter="fade">
+                                      <p:cBhvr>
+                                        <p:cTn id="421" dur="500"/>
+                                        <p:tgtEl>
+                                          <p:spTgt spid="123"/>
+                                        </p:tgtEl>
+                                      </p:cBhvr>
+                                    </p:animEffect>
+                                  </p:childTnLst>
+                                </p:cTn>
+                              </p:par>
+                              <p:par>
+                                <p:cTn id="422" presetID="10" presetClass="entr" presetSubtype="0" fill="hold" nodeType="withEffect">
+                                  <p:stCondLst>
+                                    <p:cond delay="0"/>
+                                  </p:stCondLst>
+                                  <p:childTnLst>
+                                    <p:set>
+                                      <p:cBhvr>
+                                        <p:cTn id="423" dur="1" fill="hold">
+                                          <p:stCondLst>
+                                            <p:cond delay="0"/>
+                                          </p:stCondLst>
+                                        </p:cTn>
+                                        <p:tgtEl>
+                                          <p:spTgt spid="30"/>
+                                        </p:tgtEl>
+                                        <p:attrNameLst>
+                                          <p:attrName>style.visibility</p:attrName>
+                                        </p:attrNameLst>
+                                      </p:cBhvr>
+                                      <p:to>
+                                        <p:strVal val="visible"/>
+                                      </p:to>
+                                    </p:set>
+                                    <p:animEffect transition="in" filter="fade">
+                                      <p:cBhvr>
+                                        <p:cTn id="424" dur="500"/>
+                                        <p:tgtEl>
+                                          <p:spTgt spid="30"/>
+                                        </p:tgtEl>
+                                      </p:cBhvr>
+                                    </p:animEffect>
+                                  </p:childTnLst>
+                                </p:cTn>
+                              </p:par>
+                              <p:par>
+                                <p:cTn id="425" presetID="10" presetClass="entr" presetSubtype="0" fill="hold" grpId="0" nodeType="withEffect">
+                                  <p:stCondLst>
+                                    <p:cond delay="0"/>
+                                  </p:stCondLst>
+                                  <p:childTnLst>
+                                    <p:set>
+                                      <p:cBhvr>
+                                        <p:cTn id="426" dur="1" fill="hold">
+                                          <p:stCondLst>
+                                            <p:cond delay="0"/>
+                                          </p:stCondLst>
+                                        </p:cTn>
+                                        <p:tgtEl>
+                                          <p:spTgt spid="129"/>
+                                        </p:tgtEl>
+                                        <p:attrNameLst>
+                                          <p:attrName>style.visibility</p:attrName>
+                                        </p:attrNameLst>
+                                      </p:cBhvr>
+                                      <p:to>
+                                        <p:strVal val="visible"/>
+                                      </p:to>
+                                    </p:set>
+                                    <p:animEffect transition="in" filter="fade">
+                                      <p:cBhvr>
+                                        <p:cTn id="427" dur="500"/>
+                                        <p:tgtEl>
+                                          <p:spTgt spid="129"/>
+                                        </p:tgtEl>
+                                      </p:cBhvr>
+                                    </p:animEffect>
+                                  </p:childTnLst>
+                                </p:cTn>
+                              </p:par>
+                              <p:par>
+                                <p:cTn id="428" presetID="10" presetClass="entr" presetSubtype="0" fill="hold" nodeType="withEffect">
+                                  <p:stCondLst>
+                                    <p:cond delay="0"/>
+                                  </p:stCondLst>
+                                  <p:childTnLst>
+                                    <p:set>
+                                      <p:cBhvr>
+                                        <p:cTn id="429" dur="1" fill="hold">
+                                          <p:stCondLst>
+                                            <p:cond delay="0"/>
+                                          </p:stCondLst>
+                                        </p:cTn>
+                                        <p:tgtEl>
+                                          <p:spTgt spid="130"/>
+                                        </p:tgtEl>
+                                        <p:attrNameLst>
+                                          <p:attrName>style.visibility</p:attrName>
+                                        </p:attrNameLst>
+                                      </p:cBhvr>
+                                      <p:to>
+                                        <p:strVal val="visible"/>
+                                      </p:to>
+                                    </p:set>
+                                    <p:animEffect transition="in" filter="fade">
+                                      <p:cBhvr>
+                                        <p:cTn id="430" dur="500"/>
+                                        <p:tgtEl>
+                                          <p:spTgt spid="130"/>
+                                        </p:tgtEl>
+                                      </p:cBhvr>
+                                    </p:animEffect>
+                                  </p:childTnLst>
+                                </p:cTn>
+                              </p:par>
+                            </p:childTnLst>
+                          </p:cTn>
+                        </p:par>
+                      </p:childTnLst>
+                    </p:cTn>
+                  </p:par>
                 </p:childTnLst>
               </p:cTn>
               <p:prevCondLst>
@@ -19324,6 +21038,10 @@
       <p:bldP spid="112" grpId="0" animBg="1"/>
       <p:bldP spid="120" grpId="0" animBg="1"/>
       <p:bldP spid="133" grpId="0" animBg="1"/>
+      <p:bldP spid="105" grpId="0"/>
+      <p:bldP spid="123" grpId="0"/>
+      <p:bldP spid="128" grpId="0" animBg="1"/>
+      <p:bldP spid="129" grpId="0"/>
     </p:bldLst>
   </p:timing>
 </p:sld>
@@ -19571,7 +21289,7 @@
         <p:spPr>
           <a:xfrm>
             <a:off x="2321668" y="1621653"/>
-            <a:ext cx="1355387" cy="3436730"/>
+            <a:ext cx="4565515" cy="3436730"/>
           </a:xfrm>
           <a:prstGeom prst="rect">
             <a:avLst/>
@@ -19630,6 +21348,128 @@
   <p:clrMapOvr>
     <a:masterClrMapping/>
   </p:clrMapOvr>
+  <p:timing>
+    <p:tnLst>
+      <p:par>
+        <p:cTn id="1" dur="indefinite" restart="never" nodeType="tmRoot">
+          <p:childTnLst>
+            <p:seq concurrent="1" nextAc="seek">
+              <p:cTn id="2" dur="indefinite" nodeType="mainSeq">
+                <p:childTnLst>
+                  <p:par>
+                    <p:cTn id="3" fill="hold">
+                      <p:stCondLst>
+                        <p:cond delay="indefinite"/>
+                      </p:stCondLst>
+                      <p:childTnLst>
+                        <p:par>
+                          <p:cTn id="4" fill="hold">
+                            <p:stCondLst>
+                              <p:cond delay="0"/>
+                            </p:stCondLst>
+                            <p:childTnLst>
+                              <p:par>
+                                <p:cTn id="5" presetID="10" presetClass="entr" presetSubtype="0" fill="hold" grpId="0" nodeType="clickEffect">
+                                  <p:stCondLst>
+                                    <p:cond delay="0"/>
+                                  </p:stCondLst>
+                                  <p:childTnLst>
+                                    <p:set>
+                                      <p:cBhvr>
+                                        <p:cTn id="6" dur="1" fill="hold">
+                                          <p:stCondLst>
+                                            <p:cond delay="0"/>
+                                          </p:stCondLst>
+                                        </p:cTn>
+                                        <p:tgtEl>
+                                          <p:spTgt spid="6"/>
+                                        </p:tgtEl>
+                                        <p:attrNameLst>
+                                          <p:attrName>style.visibility</p:attrName>
+                                        </p:attrNameLst>
+                                      </p:cBhvr>
+                                      <p:to>
+                                        <p:strVal val="visible"/>
+                                      </p:to>
+                                    </p:set>
+                                    <p:animEffect transition="in" filter="fade">
+                                      <p:cBhvr>
+                                        <p:cTn id="7" dur="500"/>
+                                        <p:tgtEl>
+                                          <p:spTgt spid="6"/>
+                                        </p:tgtEl>
+                                      </p:cBhvr>
+                                    </p:animEffect>
+                                  </p:childTnLst>
+                                </p:cTn>
+                              </p:par>
+                              <p:par>
+                                <p:cTn id="8" presetID="10" presetClass="exit" presetSubtype="0" fill="hold" grpId="0" nodeType="withEffect">
+                                  <p:stCondLst>
+                                    <p:cond delay="0"/>
+                                  </p:stCondLst>
+                                  <p:childTnLst>
+                                    <p:animEffect transition="out" filter="fade">
+                                      <p:cBhvr>
+                                        <p:cTn id="9" dur="500"/>
+                                        <p:tgtEl>
+                                          <p:spTgt spid="4"/>
+                                        </p:tgtEl>
+                                      </p:cBhvr>
+                                    </p:animEffect>
+                                    <p:set>
+                                      <p:cBhvr>
+                                        <p:cTn id="10" dur="1" fill="hold">
+                                          <p:stCondLst>
+                                            <p:cond delay="499"/>
+                                          </p:stCondLst>
+                                        </p:cTn>
+                                        <p:tgtEl>
+                                          <p:spTgt spid="4"/>
+                                        </p:tgtEl>
+                                        <p:attrNameLst>
+                                          <p:attrName>style.visibility</p:attrName>
+                                        </p:attrNameLst>
+                                      </p:cBhvr>
+                                      <p:to>
+                                        <p:strVal val="hidden"/>
+                                      </p:to>
+                                    </p:set>
+                                  </p:childTnLst>
+                                </p:cTn>
+                              </p:par>
+                            </p:childTnLst>
+                          </p:cTn>
+                        </p:par>
+                      </p:childTnLst>
+                    </p:cTn>
+                  </p:par>
+                </p:childTnLst>
+              </p:cTn>
+              <p:prevCondLst>
+                <p:cond evt="onPrev" delay="0">
+                  <p:tgtEl>
+                    <p:sldTgt/>
+                  </p:tgtEl>
+                </p:cond>
+              </p:prevCondLst>
+              <p:nextCondLst>
+                <p:cond evt="onNext" delay="0">
+                  <p:tgtEl>
+                    <p:sldTgt/>
+                  </p:tgtEl>
+                </p:cond>
+              </p:nextCondLst>
+            </p:seq>
+          </p:childTnLst>
+        </p:cTn>
+      </p:par>
+    </p:tnLst>
+    <p:bldLst>
+      <p:bldP spid="4" grpId="0" animBg="1"/>
+      <p:bldP spid="6" grpId="0" animBg="1"/>
+    </p:bldLst>
+  </p:timing>
 </p:sld>
 </file>
 
@@ -21521,15 +23361,112 @@
             <p:ph sz="half" idx="1"/>
           </p:nvPr>
         </p:nvSpPr>
-        <p:spPr/>
+        <p:spPr>
+          <a:xfrm>
+            <a:off x="140368" y="851067"/>
+            <a:ext cx="4218050" cy="5297070"/>
+          </a:xfrm>
+        </p:spPr>
         <p:txBody>
-          <a:bodyPr/>
+          <a:bodyPr>
+            <a:normAutofit/>
+          </a:bodyPr>
           <a:lstStyle/>
           <a:p>
-            <a:endParaRPr lang="en-US"/>
+            <a:pPr marL="0" indent="0">
+              <a:buNone/>
+            </a:pPr>
+            <a:r>
+              <a:rPr lang="en-US" dirty="0"/>
+              <a:t>Ultimately, all the LSTM architectures I built fell into one of three categories:</a:t>
+            </a:r>
+          </a:p>
+          <a:p>
+            <a:pPr marL="514350" indent="-514350">
+              <a:buFont typeface="+mj-lt"/>
+              <a:buAutoNum type="arabicPeriod"/>
+            </a:pPr>
+            <a:r>
+              <a:rPr lang="en-US" sz="2000" dirty="0"/>
+              <a:t>Models that didn't predict any outbreaks (likely underfit)</a:t>
+            </a:r>
+          </a:p>
+          <a:p>
+            <a:pPr marL="514350" indent="-514350">
+              <a:buFont typeface="+mj-lt"/>
+              <a:buAutoNum type="arabicPeriod"/>
+            </a:pPr>
+            <a:r>
+              <a:rPr lang="en-US" sz="2000" dirty="0"/>
+              <a:t>Models that predicted nearly constant outbreaks (likely overfit)</a:t>
+            </a:r>
+          </a:p>
+          <a:p>
+            <a:pPr marL="514350" indent="-514350">
+              <a:buFont typeface="+mj-lt"/>
+              <a:buAutoNum type="arabicPeriod"/>
+            </a:pPr>
+            <a:r>
+              <a:rPr lang="en-US" sz="2000" dirty="0"/>
+              <a:t>Models that seemed to predict when an outbreak would happen, but continued predicting outbreak numbers for dozens of weeks after the fact. The error from these extended high predictions made these models unusable. </a:t>
+            </a:r>
+          </a:p>
+          <a:p>
+            <a:pPr marL="514350" indent="-514350">
+              <a:buFont typeface="+mj-lt"/>
+              <a:buAutoNum type="arabicPeriod"/>
+            </a:pPr>
+            <a:endParaRPr lang="en-US" dirty="0"/>
           </a:p>
         </p:txBody>
       </p:sp>
+      <p:pic>
+        <p:nvPicPr>
+          <p:cNvPr id="1028" name="Picture 4">
+            <a:extLst>
+              <a:ext uri="{FF2B5EF4-FFF2-40B4-BE49-F238E27FC236}">
+                <a16:creationId xmlns:a16="http://schemas.microsoft.com/office/drawing/2014/main" id="{978767D6-EE50-4A4A-81BB-549B005DBDBF}"/>
+              </a:ext>
+            </a:extLst>
+          </p:cNvPr>
+          <p:cNvPicPr>
+            <a:picLocks noChangeAspect="1" noChangeArrowheads="1"/>
+          </p:cNvPicPr>
+          <p:nvPr/>
+        </p:nvPicPr>
+        <p:blipFill>
+          <a:blip r:embed="rId2">
+            <a:extLst>
+              <a:ext uri="{28A0092B-C50C-407E-A947-70E740481C1C}">
+                <a14:useLocalDpi xmlns:a14="http://schemas.microsoft.com/office/drawing/2010/main" val="0"/>
+              </a:ext>
+            </a:extLst>
+          </a:blip>
+          <a:srcRect/>
+          <a:stretch>
+            <a:fillRect/>
+          </a:stretch>
+        </p:blipFill>
+        <p:spPr bwMode="auto">
+          <a:xfrm>
+            <a:off x="4664179" y="1728669"/>
+            <a:ext cx="6927273" cy="3400661"/>
+          </a:xfrm>
+          <a:prstGeom prst="rect">
+            <a:avLst/>
+          </a:prstGeom>
+          <a:noFill/>
+          <a:extLst>
+            <a:ext uri="{909E8E84-426E-40DD-AFC4-6F175D3DCCD1}">
+              <a14:hiddenFill xmlns:a14="http://schemas.microsoft.com/office/drawing/2010/main">
+                <a:solidFill>
+                  <a:srgbClr val="FFFFFF"/>
+                </a:solidFill>
+              </a14:hiddenFill>
+            </a:ext>
+          </a:extLst>
+        </p:spPr>
+      </p:pic>
     </p:spTree>
     <p:extLst>
       <p:ext uri="{BB962C8B-B14F-4D97-AF65-F5344CB8AC3E}">
@@ -22966,7 +24903,7 @@
           <p:nvPr/>
         </p:nvPicPr>
         <p:blipFill>
-          <a:blip r:embed="rId2">
+          <a:blip r:embed="rId3">
             <a:extLst>
               <a:ext uri="{28A0092B-C50C-407E-A947-70E740481C1C}">
                 <a14:useLocalDpi xmlns:a14="http://schemas.microsoft.com/office/drawing/2010/main" val="0"/>
@@ -22980,7 +24917,7 @@
         </p:blipFill>
         <p:spPr bwMode="auto">
           <a:xfrm>
-            <a:off x="466239" y="3080900"/>
+            <a:off x="466239" y="2773882"/>
             <a:ext cx="5629761" cy="2415472"/>
           </a:xfrm>
           <a:prstGeom prst="rect">
@@ -23013,7 +24950,7 @@
           <p:nvPr/>
         </p:nvPicPr>
         <p:blipFill>
-          <a:blip r:embed="rId3">
+          <a:blip r:embed="rId4">
             <a:extLst>
               <a:ext uri="{28A0092B-C50C-407E-A947-70E740481C1C}">
                 <a14:useLocalDpi xmlns:a14="http://schemas.microsoft.com/office/drawing/2010/main" val="0"/>
@@ -23027,7 +24964,7 @@
         </p:blipFill>
         <p:spPr bwMode="auto">
           <a:xfrm>
-            <a:off x="6096000" y="3080900"/>
+            <a:off x="6096000" y="2773882"/>
             <a:ext cx="5629761" cy="2440204"/>
           </a:xfrm>
           <a:prstGeom prst="rect">
@@ -23060,7 +24997,7 @@
           <p:nvPr/>
         </p:nvPicPr>
         <p:blipFill>
-          <a:blip r:embed="rId4">
+          <a:blip r:embed="rId5">
             <a:extLst>
               <a:ext uri="{28A0092B-C50C-407E-A947-70E740481C1C}">
                 <a14:useLocalDpi xmlns:a14="http://schemas.microsoft.com/office/drawing/2010/main" val="0"/>
@@ -23107,7 +25044,7 @@
           <p:nvPr/>
         </p:nvPicPr>
         <p:blipFill>
-          <a:blip r:embed="rId5">
+          <a:blip r:embed="rId6">
             <a:extLst>
               <a:ext uri="{28A0092B-C50C-407E-A947-70E740481C1C}">
                 <a14:useLocalDpi xmlns:a14="http://schemas.microsoft.com/office/drawing/2010/main" val="0"/>
@@ -23154,13 +25091,13 @@
           <p:nvPr>
             <p:extLst>
               <p:ext uri="{D42A27DB-BD31-4B8C-83A1-F6EECF244321}">
-                <p14:modId xmlns:p14="http://schemas.microsoft.com/office/powerpoint/2010/main" val="3111400199"/>
+                <p14:modId xmlns:p14="http://schemas.microsoft.com/office/powerpoint/2010/main" val="1487508206"/>
               </p:ext>
             </p:extLst>
           </p:nvPr>
         </p:nvGraphicFramePr>
         <p:xfrm>
-          <a:off x="903514" y="5487725"/>
+          <a:off x="903514" y="5180707"/>
           <a:ext cx="4866614" cy="1188720"/>
         </p:xfrm>
         <a:graphic>
@@ -23327,13 +25264,13 @@
           <p:nvPr>
             <p:extLst>
               <p:ext uri="{D42A27DB-BD31-4B8C-83A1-F6EECF244321}">
-                <p14:modId xmlns:p14="http://schemas.microsoft.com/office/powerpoint/2010/main" val="207152053"/>
+                <p14:modId xmlns:p14="http://schemas.microsoft.com/office/powerpoint/2010/main" val="998846194"/>
               </p:ext>
             </p:extLst>
           </p:nvPr>
         </p:nvGraphicFramePr>
         <p:xfrm>
-          <a:off x="6533275" y="5487725"/>
+          <a:off x="6533275" y="5180707"/>
           <a:ext cx="4866614" cy="1188720"/>
         </p:xfrm>
         <a:graphic>
@@ -25593,7 +27530,7 @@
         <p:spPr>
           <a:xfrm>
             <a:off x="140368" y="762001"/>
-            <a:ext cx="8274289" cy="4678204"/>
+            <a:ext cx="9035716" cy="4955203"/>
           </a:xfrm>
           <a:prstGeom prst="rect">
             <a:avLst/>
@@ -25618,7 +27555,7 @@
             </a:pPr>
             <a:r>
               <a:rPr lang="en-US" dirty="0"/>
-              <a:t>Download my LSTM guide and code an LSTM forward pass with just </a:t>
+              <a:t>Download The LSTM Reference Card and code an LSTM forward pass with just </a:t>
             </a:r>
             <a:r>
               <a:rPr lang="en-US" dirty="0" err="1"/>
@@ -25686,6 +27623,19 @@
                 <a:hlinkClick r:id="rId5"/>
               </a:rPr>
               <a:t>) suggesting you can trim an LSTM down to ONLY a forget gate</a:t>
+            </a:r>
+            <a:endParaRPr lang="en-US" dirty="0"/>
+          </a:p>
+          <a:p>
+            <a:pPr marL="742950" lvl="1" indent="-285750">
+              <a:buFont typeface="Arial" panose="020B0604020202020204" pitchFamily="34" charset="0"/>
+              <a:buChar char="•"/>
+            </a:pPr>
+            <a:r>
+              <a:rPr lang="en-US" dirty="0">
+                <a:hlinkClick r:id="rId6"/>
+              </a:rPr>
+              <a:t>Walk Forward Validation guide by Dr. Brownlee</a:t>
             </a:r>
             <a:endParaRPr lang="en-US" dirty="0"/>
           </a:p>
@@ -25853,31 +27803,31 @@
             </a:r>
             <a:r>
               <a:rPr lang="en-US" dirty="0">
-                <a:hlinkClick r:id="rId6"/>
+                <a:hlinkClick r:id="rId7"/>
               </a:rPr>
               <a:t>/</a:t>
             </a:r>
             <a:r>
               <a:rPr lang="en-US" dirty="0" err="1">
-                <a:hlinkClick r:id="rId6"/>
+                <a:hlinkClick r:id="rId7"/>
               </a:rPr>
               <a:t>conditg</a:t>
             </a:r>
             <a:r>
               <a:rPr lang="en-US" dirty="0">
-                <a:hlinkClick r:id="rId6"/>
+                <a:hlinkClick r:id="rId7"/>
               </a:rPr>
               <a:t>/</a:t>
             </a:r>
             <a:r>
               <a:rPr lang="en-US" dirty="0" err="1">
-                <a:hlinkClick r:id="rId6"/>
+                <a:hlinkClick r:id="rId7"/>
               </a:rPr>
               <a:t>deng</a:t>
             </a:r>
             <a:r>
               <a:rPr lang="en-US" dirty="0">
-                <a:hlinkClick r:id="rId6"/>
+                <a:hlinkClick r:id="rId7"/>
               </a:rPr>
               <a:t>-ai</a:t>
             </a:r>
@@ -26438,7 +28388,7 @@
           <p:nvPr/>
         </p:nvPicPr>
         <p:blipFill>
-          <a:blip r:embed="rId2">
+          <a:blip r:embed="rId3">
             <a:extLst>
               <a:ext uri="{28A0092B-C50C-407E-A947-70E740481C1C}">
                 <a14:useLocalDpi xmlns:a14="http://schemas.microsoft.com/office/drawing/2010/main" val="0"/>
@@ -26485,7 +28435,7 @@
           <p:nvPr/>
         </p:nvPicPr>
         <p:blipFill>
-          <a:blip r:embed="rId3">
+          <a:blip r:embed="rId4">
             <a:extLst>
               <a:ext uri="{28A0092B-C50C-407E-A947-70E740481C1C}">
                 <a14:useLocalDpi xmlns:a14="http://schemas.microsoft.com/office/drawing/2010/main" val="0"/>
@@ -28397,7 +30347,11 @@
             </a:pPr>
             <a:r>
               <a:rPr lang="en-US" dirty="0"/>
-              <a:t>Long short term memory neural network</a:t>
+              <a:t>Long short term memory neural network </a:t>
+            </a:r>
+            <a:r>
+              <a:rPr lang="en-US" b="1" dirty="0"/>
+              <a:t>(LSTM)</a:t>
             </a:r>
           </a:p>
           <a:p>

</xml_diff>